<commit_message>
edited committee meeting slides
</commit_message>
<xml_diff>
--- a/Resources/2021_committeemeeting.pptx
+++ b/Resources/2021_committeemeeting.pptx
@@ -7,6 +7,24 @@
   <p:sldIdLst>
     <p:sldId id="256" r:id="rId2"/>
     <p:sldId id="257" r:id="rId3"/>
+    <p:sldId id="258" r:id="rId4"/>
+    <p:sldId id="259" r:id="rId5"/>
+    <p:sldId id="262" r:id="rId6"/>
+    <p:sldId id="263" r:id="rId7"/>
+    <p:sldId id="264" r:id="rId8"/>
+    <p:sldId id="265" r:id="rId9"/>
+    <p:sldId id="266" r:id="rId10"/>
+    <p:sldId id="269" r:id="rId11"/>
+    <p:sldId id="267" r:id="rId12"/>
+    <p:sldId id="268" r:id="rId13"/>
+    <p:sldId id="270" r:id="rId14"/>
+    <p:sldId id="271" r:id="rId15"/>
+    <p:sldId id="272" r:id="rId16"/>
+    <p:sldId id="273" r:id="rId17"/>
+    <p:sldId id="274" r:id="rId18"/>
+    <p:sldId id="275" r:id="rId19"/>
+    <p:sldId id="276" r:id="rId20"/>
+    <p:sldId id="277" r:id="rId21"/>
   </p:sldIdLst>
   <p:sldSz cx="12192000" cy="6858000"/>
   <p:notesSz cx="6858000" cy="9144000"/>
@@ -105,6 +123,11 @@
       </a:defRPr>
     </a:lvl9pPr>
   </p:defaultTextStyle>
+  <p:extLst>
+    <p:ext uri="{EFAFB233-063F-42B5-8137-9DF3F51BA10A}">
+      <p15:sldGuideLst xmlns:p15="http://schemas.microsoft.com/office/powerpoint/2012/main"/>
+    </p:ext>
+  </p:extLst>
 </p:presentation>
 </file>
 
@@ -255,7 +278,7 @@
           <a:p>
             <a:fld id="{2A2D5597-7C15-6845-B20A-A9BC6CA7E298}" type="datetimeFigureOut">
               <a:rPr lang="en-US" smtClean="0"/>
-              <a:t>1/4/21</a:t>
+              <a:t>1/5/2021</a:t>
             </a:fld>
             <a:endParaRPr lang="en-US"/>
           </a:p>
@@ -453,7 +476,7 @@
           <a:p>
             <a:fld id="{2A2D5597-7C15-6845-B20A-A9BC6CA7E298}" type="datetimeFigureOut">
               <a:rPr lang="en-US" smtClean="0"/>
-              <a:t>1/4/21</a:t>
+              <a:t>1/5/2021</a:t>
             </a:fld>
             <a:endParaRPr lang="en-US"/>
           </a:p>
@@ -661,7 +684,7 @@
           <a:p>
             <a:fld id="{2A2D5597-7C15-6845-B20A-A9BC6CA7E298}" type="datetimeFigureOut">
               <a:rPr lang="en-US" smtClean="0"/>
-              <a:t>1/4/21</a:t>
+              <a:t>1/5/2021</a:t>
             </a:fld>
             <a:endParaRPr lang="en-US"/>
           </a:p>
@@ -859,7 +882,7 @@
           <a:p>
             <a:fld id="{2A2D5597-7C15-6845-B20A-A9BC6CA7E298}" type="datetimeFigureOut">
               <a:rPr lang="en-US" smtClean="0"/>
-              <a:t>1/4/21</a:t>
+              <a:t>1/5/2021</a:t>
             </a:fld>
             <a:endParaRPr lang="en-US"/>
           </a:p>
@@ -1134,7 +1157,7 @@
           <a:p>
             <a:fld id="{2A2D5597-7C15-6845-B20A-A9BC6CA7E298}" type="datetimeFigureOut">
               <a:rPr lang="en-US" smtClean="0"/>
-              <a:t>1/4/21</a:t>
+              <a:t>1/5/2021</a:t>
             </a:fld>
             <a:endParaRPr lang="en-US"/>
           </a:p>
@@ -1399,7 +1422,7 @@
           <a:p>
             <a:fld id="{2A2D5597-7C15-6845-B20A-A9BC6CA7E298}" type="datetimeFigureOut">
               <a:rPr lang="en-US" smtClean="0"/>
-              <a:t>1/4/21</a:t>
+              <a:t>1/5/2021</a:t>
             </a:fld>
             <a:endParaRPr lang="en-US"/>
           </a:p>
@@ -1811,7 +1834,7 @@
           <a:p>
             <a:fld id="{2A2D5597-7C15-6845-B20A-A9BC6CA7E298}" type="datetimeFigureOut">
               <a:rPr lang="en-US" smtClean="0"/>
-              <a:t>1/4/21</a:t>
+              <a:t>1/5/2021</a:t>
             </a:fld>
             <a:endParaRPr lang="en-US"/>
           </a:p>
@@ -1952,7 +1975,7 @@
           <a:p>
             <a:fld id="{2A2D5597-7C15-6845-B20A-A9BC6CA7E298}" type="datetimeFigureOut">
               <a:rPr lang="en-US" smtClean="0"/>
-              <a:t>1/4/21</a:t>
+              <a:t>1/5/2021</a:t>
             </a:fld>
             <a:endParaRPr lang="en-US"/>
           </a:p>
@@ -2065,7 +2088,7 @@
           <a:p>
             <a:fld id="{2A2D5597-7C15-6845-B20A-A9BC6CA7E298}" type="datetimeFigureOut">
               <a:rPr lang="en-US" smtClean="0"/>
-              <a:t>1/4/21</a:t>
+              <a:t>1/5/2021</a:t>
             </a:fld>
             <a:endParaRPr lang="en-US"/>
           </a:p>
@@ -2376,7 +2399,7 @@
           <a:p>
             <a:fld id="{2A2D5597-7C15-6845-B20A-A9BC6CA7E298}" type="datetimeFigureOut">
               <a:rPr lang="en-US" smtClean="0"/>
-              <a:t>1/4/21</a:t>
+              <a:t>1/5/2021</a:t>
             </a:fld>
             <a:endParaRPr lang="en-US"/>
           </a:p>
@@ -2664,7 +2687,7 @@
           <a:p>
             <a:fld id="{2A2D5597-7C15-6845-B20A-A9BC6CA7E298}" type="datetimeFigureOut">
               <a:rPr lang="en-US" smtClean="0"/>
-              <a:t>1/4/21</a:t>
+              <a:t>1/5/2021</a:t>
             </a:fld>
             <a:endParaRPr lang="en-US"/>
           </a:p>
@@ -2905,7 +2928,7 @@
           <a:p>
             <a:fld id="{2A2D5597-7C15-6845-B20A-A9BC6CA7E298}" type="datetimeFigureOut">
               <a:rPr lang="en-US" smtClean="0"/>
-              <a:t>1/4/21</a:t>
+              <a:t>1/5/2021</a:t>
             </a:fld>
             <a:endParaRPr lang="en-US"/>
           </a:p>
@@ -3465,7 +3488,7 @@
         </p:nvSpPr>
         <p:spPr>
           <a:xfrm>
-            <a:off x="7302843" y="6400801"/>
+            <a:off x="6915665" y="6400801"/>
             <a:ext cx="5276335" cy="369332"/>
           </a:xfrm>
           <a:prstGeom prst="rect">
@@ -3479,27 +3502,31 @@
           </a:bodyPr>
           <a:lstStyle/>
           <a:p>
+            <a:pPr algn="r"/>
             <a:r>
               <a:rPr lang="en-US" i="1" dirty="0">
                 <a:solidFill>
-                  <a:schemeClr val="bg1"/>
+                  <a:srgbClr val="C0C0C0"/>
                 </a:solidFill>
+                <a:latin typeface="Garamond" panose="02020404030301010803" pitchFamily="18" charset="0"/>
               </a:rPr>
               <a:t>https://</a:t>
             </a:r>
             <a:r>
               <a:rPr lang="en-US" i="1" dirty="0" err="1">
                 <a:solidFill>
-                  <a:schemeClr val="bg1"/>
+                  <a:srgbClr val="C0C0C0"/>
                 </a:solidFill>
+                <a:latin typeface="Garamond" panose="02020404030301010803" pitchFamily="18" charset="0"/>
               </a:rPr>
               <a:t>wallpapercave.com</a:t>
             </a:r>
             <a:r>
               <a:rPr lang="en-US" i="1" dirty="0">
                 <a:solidFill>
-                  <a:schemeClr val="bg1"/>
+                  <a:srgbClr val="C0C0C0"/>
                 </a:solidFill>
+                <a:latin typeface="Garamond" panose="02020404030301010803" pitchFamily="18" charset="0"/>
               </a:rPr>
               <a:t>/cows-wallpapers</a:t>
             </a:r>
@@ -3510,6 +3537,972 @@
     <p:extLst>
       <p:ext uri="{BB962C8B-B14F-4D97-AF65-F5344CB8AC3E}">
         <p14:creationId xmlns:p14="http://schemas.microsoft.com/office/powerpoint/2010/main" val="1479111860"/>
+      </p:ext>
+    </p:extLst>
+  </p:cSld>
+  <p:clrMapOvr>
+    <a:masterClrMapping/>
+  </p:clrMapOvr>
+</p:sld>
+</file>
+
+<file path=ppt/slides/slide10.xml><?xml version="1.0" encoding="utf-8"?>
+<p:sld xmlns:a="http://schemas.openxmlformats.org/drawingml/2006/main" xmlns:r="http://schemas.openxmlformats.org/officeDocument/2006/relationships" xmlns:p="http://schemas.openxmlformats.org/presentationml/2006/main">
+  <p:cSld>
+    <p:spTree>
+      <p:nvGrpSpPr>
+        <p:cNvPr id="1" name=""/>
+        <p:cNvGrpSpPr/>
+        <p:nvPr/>
+      </p:nvGrpSpPr>
+      <p:grpSpPr>
+        <a:xfrm>
+          <a:off x="0" y="0"/>
+          <a:ext cx="0" cy="0"/>
+          <a:chOff x="0" y="0"/>
+          <a:chExt cx="0" cy="0"/>
+        </a:xfrm>
+      </p:grpSpPr>
+      <p:sp>
+        <p:nvSpPr>
+          <p:cNvPr id="2" name="Title 1">
+            <a:extLst>
+              <a:ext uri="{FF2B5EF4-FFF2-40B4-BE49-F238E27FC236}">
+                <a16:creationId xmlns:a16="http://schemas.microsoft.com/office/drawing/2014/main" id="{5B6E373C-A14C-4341-BE1D-1568CFDA71A0}"/>
+              </a:ext>
+            </a:extLst>
+          </p:cNvPr>
+          <p:cNvSpPr>
+            <a:spLocks noGrp="1"/>
+          </p:cNvSpPr>
+          <p:nvPr>
+            <p:ph type="title"/>
+          </p:nvPr>
+        </p:nvSpPr>
+        <p:spPr>
+          <a:xfrm>
+            <a:off x="838199" y="365125"/>
+            <a:ext cx="11010499" cy="1325563"/>
+          </a:xfrm>
+        </p:spPr>
+        <p:txBody>
+          <a:bodyPr/>
+          <a:lstStyle/>
+          <a:p>
+            <a:r>
+              <a:rPr lang="en-US" dirty="0">
+                <a:latin typeface="Garamond" panose="02020404030301010803" pitchFamily="18" charset="0"/>
+              </a:rPr>
+              <a:t>Phylogenetic Tree Result</a:t>
+            </a:r>
+          </a:p>
+        </p:txBody>
+      </p:sp>
+      <p:sp>
+        <p:nvSpPr>
+          <p:cNvPr id="3" name="Content Placeholder 2">
+            <a:extLst>
+              <a:ext uri="{FF2B5EF4-FFF2-40B4-BE49-F238E27FC236}">
+                <a16:creationId xmlns:a16="http://schemas.microsoft.com/office/drawing/2014/main" id="{464A2D37-3E87-584A-A0D4-8B6E512E9D7E}"/>
+              </a:ext>
+            </a:extLst>
+          </p:cNvPr>
+          <p:cNvSpPr>
+            <a:spLocks noGrp="1"/>
+          </p:cNvSpPr>
+          <p:nvPr>
+            <p:ph idx="1"/>
+          </p:nvPr>
+        </p:nvSpPr>
+        <p:spPr/>
+        <p:txBody>
+          <a:bodyPr/>
+          <a:lstStyle/>
+          <a:p>
+            <a:endParaRPr lang="en-US" dirty="0">
+              <a:latin typeface="Garamond" panose="02020404030301010803" pitchFamily="18" charset="0"/>
+            </a:endParaRPr>
+          </a:p>
+        </p:txBody>
+      </p:sp>
+    </p:spTree>
+    <p:extLst>
+      <p:ext uri="{BB962C8B-B14F-4D97-AF65-F5344CB8AC3E}">
+        <p14:creationId xmlns:p14="http://schemas.microsoft.com/office/powerpoint/2010/main" val="1399056602"/>
+      </p:ext>
+    </p:extLst>
+  </p:cSld>
+  <p:clrMapOvr>
+    <a:masterClrMapping/>
+  </p:clrMapOvr>
+</p:sld>
+</file>
+
+<file path=ppt/slides/slide11.xml><?xml version="1.0" encoding="utf-8"?>
+<p:sld xmlns:a="http://schemas.openxmlformats.org/drawingml/2006/main" xmlns:r="http://schemas.openxmlformats.org/officeDocument/2006/relationships" xmlns:p="http://schemas.openxmlformats.org/presentationml/2006/main">
+  <p:cSld>
+    <p:spTree>
+      <p:nvGrpSpPr>
+        <p:cNvPr id="1" name=""/>
+        <p:cNvGrpSpPr/>
+        <p:nvPr/>
+      </p:nvGrpSpPr>
+      <p:grpSpPr>
+        <a:xfrm>
+          <a:off x="0" y="0"/>
+          <a:ext cx="0" cy="0"/>
+          <a:chOff x="0" y="0"/>
+          <a:chExt cx="0" cy="0"/>
+        </a:xfrm>
+      </p:grpSpPr>
+      <p:sp>
+        <p:nvSpPr>
+          <p:cNvPr id="2" name="Title 1">
+            <a:extLst>
+              <a:ext uri="{FF2B5EF4-FFF2-40B4-BE49-F238E27FC236}">
+                <a16:creationId xmlns:a16="http://schemas.microsoft.com/office/drawing/2014/main" id="{5B6E373C-A14C-4341-BE1D-1568CFDA71A0}"/>
+              </a:ext>
+            </a:extLst>
+          </p:cNvPr>
+          <p:cNvSpPr>
+            <a:spLocks noGrp="1"/>
+          </p:cNvSpPr>
+          <p:nvPr>
+            <p:ph type="title"/>
+          </p:nvPr>
+        </p:nvSpPr>
+        <p:spPr>
+          <a:xfrm>
+            <a:off x="838199" y="365125"/>
+            <a:ext cx="11010499" cy="1325563"/>
+          </a:xfrm>
+        </p:spPr>
+        <p:txBody>
+          <a:bodyPr/>
+          <a:lstStyle/>
+          <a:p>
+            <a:r>
+              <a:rPr lang="en-US" dirty="0">
+                <a:latin typeface="Garamond" panose="02020404030301010803" pitchFamily="18" charset="0"/>
+              </a:rPr>
+              <a:t>Homologous Recombination Result</a:t>
+            </a:r>
+          </a:p>
+        </p:txBody>
+      </p:sp>
+      <p:sp>
+        <p:nvSpPr>
+          <p:cNvPr id="3" name="Content Placeholder 2">
+            <a:extLst>
+              <a:ext uri="{FF2B5EF4-FFF2-40B4-BE49-F238E27FC236}">
+                <a16:creationId xmlns:a16="http://schemas.microsoft.com/office/drawing/2014/main" id="{464A2D37-3E87-584A-A0D4-8B6E512E9D7E}"/>
+              </a:ext>
+            </a:extLst>
+          </p:cNvPr>
+          <p:cNvSpPr>
+            <a:spLocks noGrp="1"/>
+          </p:cNvSpPr>
+          <p:nvPr>
+            <p:ph idx="1"/>
+          </p:nvPr>
+        </p:nvSpPr>
+        <p:spPr/>
+        <p:txBody>
+          <a:bodyPr/>
+          <a:lstStyle/>
+          <a:p>
+            <a:endParaRPr lang="en-US" dirty="0">
+              <a:latin typeface="Garamond" panose="02020404030301010803" pitchFamily="18" charset="0"/>
+            </a:endParaRPr>
+          </a:p>
+        </p:txBody>
+      </p:sp>
+    </p:spTree>
+    <p:extLst>
+      <p:ext uri="{BB962C8B-B14F-4D97-AF65-F5344CB8AC3E}">
+        <p14:creationId xmlns:p14="http://schemas.microsoft.com/office/powerpoint/2010/main" val="2760501175"/>
+      </p:ext>
+    </p:extLst>
+  </p:cSld>
+  <p:clrMapOvr>
+    <a:masterClrMapping/>
+  </p:clrMapOvr>
+</p:sld>
+</file>
+
+<file path=ppt/slides/slide12.xml><?xml version="1.0" encoding="utf-8"?>
+<p:sld xmlns:a="http://schemas.openxmlformats.org/drawingml/2006/main" xmlns:r="http://schemas.openxmlformats.org/officeDocument/2006/relationships" xmlns:p="http://schemas.openxmlformats.org/presentationml/2006/main">
+  <p:cSld>
+    <p:spTree>
+      <p:nvGrpSpPr>
+        <p:cNvPr id="1" name=""/>
+        <p:cNvGrpSpPr/>
+        <p:nvPr/>
+      </p:nvGrpSpPr>
+      <p:grpSpPr>
+        <a:xfrm>
+          <a:off x="0" y="0"/>
+          <a:ext cx="0" cy="0"/>
+          <a:chOff x="0" y="0"/>
+          <a:chExt cx="0" cy="0"/>
+        </a:xfrm>
+      </p:grpSpPr>
+      <p:sp>
+        <p:nvSpPr>
+          <p:cNvPr id="2" name="Title 1">
+            <a:extLst>
+              <a:ext uri="{FF2B5EF4-FFF2-40B4-BE49-F238E27FC236}">
+                <a16:creationId xmlns:a16="http://schemas.microsoft.com/office/drawing/2014/main" id="{5B6E373C-A14C-4341-BE1D-1568CFDA71A0}"/>
+              </a:ext>
+            </a:extLst>
+          </p:cNvPr>
+          <p:cNvSpPr>
+            <a:spLocks noGrp="1"/>
+          </p:cNvSpPr>
+          <p:nvPr>
+            <p:ph type="title"/>
+          </p:nvPr>
+        </p:nvSpPr>
+        <p:spPr>
+          <a:xfrm>
+            <a:off x="838199" y="365125"/>
+            <a:ext cx="11010499" cy="1325563"/>
+          </a:xfrm>
+        </p:spPr>
+        <p:txBody>
+          <a:bodyPr/>
+          <a:lstStyle/>
+          <a:p>
+            <a:r>
+              <a:rPr lang="en-US" dirty="0">
+                <a:latin typeface="Garamond" panose="02020404030301010803" pitchFamily="18" charset="0"/>
+              </a:rPr>
+              <a:t>Selection Result</a:t>
+            </a:r>
+          </a:p>
+        </p:txBody>
+      </p:sp>
+      <p:sp>
+        <p:nvSpPr>
+          <p:cNvPr id="3" name="Content Placeholder 2">
+            <a:extLst>
+              <a:ext uri="{FF2B5EF4-FFF2-40B4-BE49-F238E27FC236}">
+                <a16:creationId xmlns:a16="http://schemas.microsoft.com/office/drawing/2014/main" id="{464A2D37-3E87-584A-A0D4-8B6E512E9D7E}"/>
+              </a:ext>
+            </a:extLst>
+          </p:cNvPr>
+          <p:cNvSpPr>
+            <a:spLocks noGrp="1"/>
+          </p:cNvSpPr>
+          <p:nvPr>
+            <p:ph idx="1"/>
+          </p:nvPr>
+        </p:nvSpPr>
+        <p:spPr/>
+        <p:txBody>
+          <a:bodyPr/>
+          <a:lstStyle/>
+          <a:p>
+            <a:endParaRPr lang="en-US" dirty="0">
+              <a:latin typeface="Garamond" panose="02020404030301010803" pitchFamily="18" charset="0"/>
+            </a:endParaRPr>
+          </a:p>
+        </p:txBody>
+      </p:sp>
+    </p:spTree>
+    <p:extLst>
+      <p:ext uri="{BB962C8B-B14F-4D97-AF65-F5344CB8AC3E}">
+        <p14:creationId xmlns:p14="http://schemas.microsoft.com/office/powerpoint/2010/main" val="624088724"/>
+      </p:ext>
+    </p:extLst>
+  </p:cSld>
+  <p:clrMapOvr>
+    <a:masterClrMapping/>
+  </p:clrMapOvr>
+</p:sld>
+</file>
+
+<file path=ppt/slides/slide13.xml><?xml version="1.0" encoding="utf-8"?>
+<p:sld xmlns:a="http://schemas.openxmlformats.org/drawingml/2006/main" xmlns:r="http://schemas.openxmlformats.org/officeDocument/2006/relationships" xmlns:p="http://schemas.openxmlformats.org/presentationml/2006/main">
+  <p:cSld>
+    <p:spTree>
+      <p:nvGrpSpPr>
+        <p:cNvPr id="1" name=""/>
+        <p:cNvGrpSpPr/>
+        <p:nvPr/>
+      </p:nvGrpSpPr>
+      <p:grpSpPr>
+        <a:xfrm>
+          <a:off x="0" y="0"/>
+          <a:ext cx="0" cy="0"/>
+          <a:chOff x="0" y="0"/>
+          <a:chExt cx="0" cy="0"/>
+        </a:xfrm>
+      </p:grpSpPr>
+      <p:sp>
+        <p:nvSpPr>
+          <p:cNvPr id="2" name="Title 1">
+            <a:extLst>
+              <a:ext uri="{FF2B5EF4-FFF2-40B4-BE49-F238E27FC236}">
+                <a16:creationId xmlns:a16="http://schemas.microsoft.com/office/drawing/2014/main" id="{5B6E373C-A14C-4341-BE1D-1568CFDA71A0}"/>
+              </a:ext>
+            </a:extLst>
+          </p:cNvPr>
+          <p:cNvSpPr>
+            <a:spLocks noGrp="1"/>
+          </p:cNvSpPr>
+          <p:nvPr>
+            <p:ph type="title"/>
+          </p:nvPr>
+        </p:nvSpPr>
+        <p:spPr>
+          <a:xfrm>
+            <a:off x="838199" y="365125"/>
+            <a:ext cx="11010499" cy="1325563"/>
+          </a:xfrm>
+        </p:spPr>
+        <p:txBody>
+          <a:bodyPr/>
+          <a:lstStyle/>
+          <a:p>
+            <a:r>
+              <a:rPr lang="en-US" dirty="0">
+                <a:latin typeface="Garamond" panose="02020404030301010803" pitchFamily="18" charset="0"/>
+              </a:rPr>
+              <a:t>Preliminary Result discussion</a:t>
+            </a:r>
+          </a:p>
+        </p:txBody>
+      </p:sp>
+      <p:sp>
+        <p:nvSpPr>
+          <p:cNvPr id="3" name="Content Placeholder 2">
+            <a:extLst>
+              <a:ext uri="{FF2B5EF4-FFF2-40B4-BE49-F238E27FC236}">
+                <a16:creationId xmlns:a16="http://schemas.microsoft.com/office/drawing/2014/main" id="{464A2D37-3E87-584A-A0D4-8B6E512E9D7E}"/>
+              </a:ext>
+            </a:extLst>
+          </p:cNvPr>
+          <p:cNvSpPr>
+            <a:spLocks noGrp="1"/>
+          </p:cNvSpPr>
+          <p:nvPr>
+            <p:ph idx="1"/>
+          </p:nvPr>
+        </p:nvSpPr>
+        <p:spPr/>
+        <p:txBody>
+          <a:bodyPr/>
+          <a:lstStyle/>
+          <a:p>
+            <a:endParaRPr lang="en-US" dirty="0">
+              <a:latin typeface="Garamond" panose="02020404030301010803" pitchFamily="18" charset="0"/>
+            </a:endParaRPr>
+          </a:p>
+        </p:txBody>
+      </p:sp>
+    </p:spTree>
+    <p:extLst>
+      <p:ext uri="{BB962C8B-B14F-4D97-AF65-F5344CB8AC3E}">
+        <p14:creationId xmlns:p14="http://schemas.microsoft.com/office/powerpoint/2010/main" val="4176570281"/>
+      </p:ext>
+    </p:extLst>
+  </p:cSld>
+  <p:clrMapOvr>
+    <a:masterClrMapping/>
+  </p:clrMapOvr>
+</p:sld>
+</file>
+
+<file path=ppt/slides/slide14.xml><?xml version="1.0" encoding="utf-8"?>
+<p:sld xmlns:a="http://schemas.openxmlformats.org/drawingml/2006/main" xmlns:r="http://schemas.openxmlformats.org/officeDocument/2006/relationships" xmlns:p="http://schemas.openxmlformats.org/presentationml/2006/main">
+  <p:cSld>
+    <p:spTree>
+      <p:nvGrpSpPr>
+        <p:cNvPr id="1" name=""/>
+        <p:cNvGrpSpPr/>
+        <p:nvPr/>
+      </p:nvGrpSpPr>
+      <p:grpSpPr>
+        <a:xfrm>
+          <a:off x="0" y="0"/>
+          <a:ext cx="0" cy="0"/>
+          <a:chOff x="0" y="0"/>
+          <a:chExt cx="0" cy="0"/>
+        </a:xfrm>
+      </p:grpSpPr>
+      <p:sp>
+        <p:nvSpPr>
+          <p:cNvPr id="2" name="Title 1">
+            <a:extLst>
+              <a:ext uri="{FF2B5EF4-FFF2-40B4-BE49-F238E27FC236}">
+                <a16:creationId xmlns:a16="http://schemas.microsoft.com/office/drawing/2014/main" id="{5B6E373C-A14C-4341-BE1D-1568CFDA71A0}"/>
+              </a:ext>
+            </a:extLst>
+          </p:cNvPr>
+          <p:cNvSpPr>
+            <a:spLocks noGrp="1"/>
+          </p:cNvSpPr>
+          <p:nvPr>
+            <p:ph type="title"/>
+          </p:nvPr>
+        </p:nvSpPr>
+        <p:spPr>
+          <a:xfrm>
+            <a:off x="838199" y="365125"/>
+            <a:ext cx="11010499" cy="1325563"/>
+          </a:xfrm>
+        </p:spPr>
+        <p:txBody>
+          <a:bodyPr/>
+          <a:lstStyle/>
+          <a:p>
+            <a:r>
+              <a:rPr lang="en-US" dirty="0">
+                <a:latin typeface="Garamond" panose="02020404030301010803" pitchFamily="18" charset="0"/>
+              </a:rPr>
+              <a:t>Specific Aims</a:t>
+            </a:r>
+          </a:p>
+        </p:txBody>
+      </p:sp>
+      <p:sp>
+        <p:nvSpPr>
+          <p:cNvPr id="3" name="Content Placeholder 2">
+            <a:extLst>
+              <a:ext uri="{FF2B5EF4-FFF2-40B4-BE49-F238E27FC236}">
+                <a16:creationId xmlns:a16="http://schemas.microsoft.com/office/drawing/2014/main" id="{464A2D37-3E87-584A-A0D4-8B6E512E9D7E}"/>
+              </a:ext>
+            </a:extLst>
+          </p:cNvPr>
+          <p:cNvSpPr>
+            <a:spLocks noGrp="1"/>
+          </p:cNvSpPr>
+          <p:nvPr>
+            <p:ph idx="1"/>
+          </p:nvPr>
+        </p:nvSpPr>
+        <p:spPr/>
+        <p:txBody>
+          <a:bodyPr/>
+          <a:lstStyle/>
+          <a:p>
+            <a:r>
+              <a:rPr lang="en-US" dirty="0">
+                <a:latin typeface="Garamond" panose="02020404030301010803" pitchFamily="18" charset="0"/>
+              </a:rPr>
+              <a:t>Aim 1 – Apply a reference agnostic machine learning approach to find genes and gene interactions that are enriched in different species.</a:t>
+            </a:r>
+          </a:p>
+          <a:p>
+            <a:r>
+              <a:rPr lang="en-US" dirty="0">
+                <a:latin typeface="Garamond" panose="02020404030301010803" pitchFamily="18" charset="0"/>
+              </a:rPr>
+              <a:t>Aim 2 - Development of a </a:t>
+            </a:r>
+            <a:r>
+              <a:rPr lang="en-US" i="1" dirty="0">
+                <a:latin typeface="Garamond" panose="02020404030301010803" pitchFamily="18" charset="0"/>
+              </a:rPr>
+              <a:t>M. </a:t>
+            </a:r>
+            <a:r>
+              <a:rPr lang="en-US" i="1" dirty="0" err="1">
+                <a:latin typeface="Garamond" panose="02020404030301010803" pitchFamily="18" charset="0"/>
+              </a:rPr>
+              <a:t>bovis</a:t>
+            </a:r>
+            <a:r>
+              <a:rPr lang="en-US" dirty="0">
+                <a:latin typeface="Garamond" panose="02020404030301010803" pitchFamily="18" charset="0"/>
+              </a:rPr>
+              <a:t> WGS genotyping pipeline for continual pathogen surveillance.</a:t>
+            </a:r>
+          </a:p>
+          <a:p>
+            <a:r>
+              <a:rPr lang="en-US" dirty="0">
+                <a:latin typeface="Garamond" panose="02020404030301010803" pitchFamily="18" charset="0"/>
+              </a:rPr>
+              <a:t>Chapter 3 – Utilize a Bayesian framework to analyze a </a:t>
+            </a:r>
+            <a:r>
+              <a:rPr lang="en-US" i="1" dirty="0">
+                <a:latin typeface="Garamond" panose="02020404030301010803" pitchFamily="18" charset="0"/>
+              </a:rPr>
+              <a:t>M. </a:t>
+            </a:r>
+            <a:r>
+              <a:rPr lang="en-US" i="1" dirty="0" err="1">
+                <a:latin typeface="Garamond" panose="02020404030301010803" pitchFamily="18" charset="0"/>
+              </a:rPr>
+              <a:t>bovis</a:t>
+            </a:r>
+            <a:r>
+              <a:rPr lang="en-US" i="1" dirty="0">
+                <a:latin typeface="Garamond" panose="02020404030301010803" pitchFamily="18" charset="0"/>
+              </a:rPr>
+              <a:t> </a:t>
+            </a:r>
+            <a:r>
+              <a:rPr lang="en-US" dirty="0">
+                <a:latin typeface="Garamond" panose="02020404030301010803" pitchFamily="18" charset="0"/>
+              </a:rPr>
+              <a:t>time-tree for understanding anthropogenic and ecological factors that impact transmission. </a:t>
+            </a:r>
+          </a:p>
+        </p:txBody>
+      </p:sp>
+    </p:spTree>
+    <p:extLst>
+      <p:ext uri="{BB962C8B-B14F-4D97-AF65-F5344CB8AC3E}">
+        <p14:creationId xmlns:p14="http://schemas.microsoft.com/office/powerpoint/2010/main" val="3344595690"/>
+      </p:ext>
+    </p:extLst>
+  </p:cSld>
+  <p:clrMapOvr>
+    <a:masterClrMapping/>
+  </p:clrMapOvr>
+</p:sld>
+</file>
+
+<file path=ppt/slides/slide15.xml><?xml version="1.0" encoding="utf-8"?>
+<p:sld xmlns:a="http://schemas.openxmlformats.org/drawingml/2006/main" xmlns:r="http://schemas.openxmlformats.org/officeDocument/2006/relationships" xmlns:p="http://schemas.openxmlformats.org/presentationml/2006/main">
+  <p:cSld>
+    <p:spTree>
+      <p:nvGrpSpPr>
+        <p:cNvPr id="1" name=""/>
+        <p:cNvGrpSpPr/>
+        <p:nvPr/>
+      </p:nvGrpSpPr>
+      <p:grpSpPr>
+        <a:xfrm>
+          <a:off x="0" y="0"/>
+          <a:ext cx="0" cy="0"/>
+          <a:chOff x="0" y="0"/>
+          <a:chExt cx="0" cy="0"/>
+        </a:xfrm>
+      </p:grpSpPr>
+      <p:sp>
+        <p:nvSpPr>
+          <p:cNvPr id="2" name="Title 1">
+            <a:extLst>
+              <a:ext uri="{FF2B5EF4-FFF2-40B4-BE49-F238E27FC236}">
+                <a16:creationId xmlns:a16="http://schemas.microsoft.com/office/drawing/2014/main" id="{5B6E373C-A14C-4341-BE1D-1568CFDA71A0}"/>
+              </a:ext>
+            </a:extLst>
+          </p:cNvPr>
+          <p:cNvSpPr>
+            <a:spLocks noGrp="1"/>
+          </p:cNvSpPr>
+          <p:nvPr>
+            <p:ph type="title"/>
+          </p:nvPr>
+        </p:nvSpPr>
+        <p:spPr>
+          <a:xfrm>
+            <a:off x="838199" y="365125"/>
+            <a:ext cx="11010499" cy="1325563"/>
+          </a:xfrm>
+        </p:spPr>
+        <p:txBody>
+          <a:bodyPr/>
+          <a:lstStyle/>
+          <a:p>
+            <a:endParaRPr lang="en-US" dirty="0">
+              <a:latin typeface="Garamond" panose="02020404030301010803" pitchFamily="18" charset="0"/>
+            </a:endParaRPr>
+          </a:p>
+        </p:txBody>
+      </p:sp>
+      <p:sp>
+        <p:nvSpPr>
+          <p:cNvPr id="3" name="Content Placeholder 2">
+            <a:extLst>
+              <a:ext uri="{FF2B5EF4-FFF2-40B4-BE49-F238E27FC236}">
+                <a16:creationId xmlns:a16="http://schemas.microsoft.com/office/drawing/2014/main" id="{464A2D37-3E87-584A-A0D4-8B6E512E9D7E}"/>
+              </a:ext>
+            </a:extLst>
+          </p:cNvPr>
+          <p:cNvSpPr>
+            <a:spLocks noGrp="1"/>
+          </p:cNvSpPr>
+          <p:nvPr>
+            <p:ph idx="1"/>
+          </p:nvPr>
+        </p:nvSpPr>
+        <p:spPr/>
+        <p:txBody>
+          <a:bodyPr/>
+          <a:lstStyle/>
+          <a:p>
+            <a:endParaRPr lang="en-US" dirty="0">
+              <a:latin typeface="Garamond" panose="02020404030301010803" pitchFamily="18" charset="0"/>
+            </a:endParaRPr>
+          </a:p>
+        </p:txBody>
+      </p:sp>
+    </p:spTree>
+    <p:extLst>
+      <p:ext uri="{BB962C8B-B14F-4D97-AF65-F5344CB8AC3E}">
+        <p14:creationId xmlns:p14="http://schemas.microsoft.com/office/powerpoint/2010/main" val="3573537596"/>
+      </p:ext>
+    </p:extLst>
+  </p:cSld>
+  <p:clrMapOvr>
+    <a:masterClrMapping/>
+  </p:clrMapOvr>
+</p:sld>
+</file>
+
+<file path=ppt/slides/slide16.xml><?xml version="1.0" encoding="utf-8"?>
+<p:sld xmlns:a="http://schemas.openxmlformats.org/drawingml/2006/main" xmlns:r="http://schemas.openxmlformats.org/officeDocument/2006/relationships" xmlns:p="http://schemas.openxmlformats.org/presentationml/2006/main">
+  <p:cSld>
+    <p:spTree>
+      <p:nvGrpSpPr>
+        <p:cNvPr id="1" name=""/>
+        <p:cNvGrpSpPr/>
+        <p:nvPr/>
+      </p:nvGrpSpPr>
+      <p:grpSpPr>
+        <a:xfrm>
+          <a:off x="0" y="0"/>
+          <a:ext cx="0" cy="0"/>
+          <a:chOff x="0" y="0"/>
+          <a:chExt cx="0" cy="0"/>
+        </a:xfrm>
+      </p:grpSpPr>
+      <p:sp>
+        <p:nvSpPr>
+          <p:cNvPr id="2" name="Title 1">
+            <a:extLst>
+              <a:ext uri="{FF2B5EF4-FFF2-40B4-BE49-F238E27FC236}">
+                <a16:creationId xmlns:a16="http://schemas.microsoft.com/office/drawing/2014/main" id="{5B6E373C-A14C-4341-BE1D-1568CFDA71A0}"/>
+              </a:ext>
+            </a:extLst>
+          </p:cNvPr>
+          <p:cNvSpPr>
+            <a:spLocks noGrp="1"/>
+          </p:cNvSpPr>
+          <p:nvPr>
+            <p:ph type="title"/>
+          </p:nvPr>
+        </p:nvSpPr>
+        <p:spPr>
+          <a:xfrm>
+            <a:off x="838199" y="365125"/>
+            <a:ext cx="11010499" cy="1325563"/>
+          </a:xfrm>
+        </p:spPr>
+        <p:txBody>
+          <a:bodyPr/>
+          <a:lstStyle/>
+          <a:p>
+            <a:endParaRPr lang="en-US" dirty="0">
+              <a:latin typeface="Garamond" panose="02020404030301010803" pitchFamily="18" charset="0"/>
+            </a:endParaRPr>
+          </a:p>
+        </p:txBody>
+      </p:sp>
+      <p:sp>
+        <p:nvSpPr>
+          <p:cNvPr id="3" name="Content Placeholder 2">
+            <a:extLst>
+              <a:ext uri="{FF2B5EF4-FFF2-40B4-BE49-F238E27FC236}">
+                <a16:creationId xmlns:a16="http://schemas.microsoft.com/office/drawing/2014/main" id="{464A2D37-3E87-584A-A0D4-8B6E512E9D7E}"/>
+              </a:ext>
+            </a:extLst>
+          </p:cNvPr>
+          <p:cNvSpPr>
+            <a:spLocks noGrp="1"/>
+          </p:cNvSpPr>
+          <p:nvPr>
+            <p:ph idx="1"/>
+          </p:nvPr>
+        </p:nvSpPr>
+        <p:spPr/>
+        <p:txBody>
+          <a:bodyPr/>
+          <a:lstStyle/>
+          <a:p>
+            <a:endParaRPr lang="en-US" dirty="0">
+              <a:latin typeface="Garamond" panose="02020404030301010803" pitchFamily="18" charset="0"/>
+            </a:endParaRPr>
+          </a:p>
+        </p:txBody>
+      </p:sp>
+    </p:spTree>
+    <p:extLst>
+      <p:ext uri="{BB962C8B-B14F-4D97-AF65-F5344CB8AC3E}">
+        <p14:creationId xmlns:p14="http://schemas.microsoft.com/office/powerpoint/2010/main" val="2152640410"/>
+      </p:ext>
+    </p:extLst>
+  </p:cSld>
+  <p:clrMapOvr>
+    <a:masterClrMapping/>
+  </p:clrMapOvr>
+</p:sld>
+</file>
+
+<file path=ppt/slides/slide17.xml><?xml version="1.0" encoding="utf-8"?>
+<p:sld xmlns:a="http://schemas.openxmlformats.org/drawingml/2006/main" xmlns:r="http://schemas.openxmlformats.org/officeDocument/2006/relationships" xmlns:p="http://schemas.openxmlformats.org/presentationml/2006/main">
+  <p:cSld>
+    <p:spTree>
+      <p:nvGrpSpPr>
+        <p:cNvPr id="1" name=""/>
+        <p:cNvGrpSpPr/>
+        <p:nvPr/>
+      </p:nvGrpSpPr>
+      <p:grpSpPr>
+        <a:xfrm>
+          <a:off x="0" y="0"/>
+          <a:ext cx="0" cy="0"/>
+          <a:chOff x="0" y="0"/>
+          <a:chExt cx="0" cy="0"/>
+        </a:xfrm>
+      </p:grpSpPr>
+      <p:sp>
+        <p:nvSpPr>
+          <p:cNvPr id="2" name="Title 1">
+            <a:extLst>
+              <a:ext uri="{FF2B5EF4-FFF2-40B4-BE49-F238E27FC236}">
+                <a16:creationId xmlns:a16="http://schemas.microsoft.com/office/drawing/2014/main" id="{5B6E373C-A14C-4341-BE1D-1568CFDA71A0}"/>
+              </a:ext>
+            </a:extLst>
+          </p:cNvPr>
+          <p:cNvSpPr>
+            <a:spLocks noGrp="1"/>
+          </p:cNvSpPr>
+          <p:nvPr>
+            <p:ph type="title"/>
+          </p:nvPr>
+        </p:nvSpPr>
+        <p:spPr>
+          <a:xfrm>
+            <a:off x="838199" y="365125"/>
+            <a:ext cx="11010499" cy="1325563"/>
+          </a:xfrm>
+        </p:spPr>
+        <p:txBody>
+          <a:bodyPr/>
+          <a:lstStyle/>
+          <a:p>
+            <a:endParaRPr lang="en-US" dirty="0">
+              <a:latin typeface="Garamond" panose="02020404030301010803" pitchFamily="18" charset="0"/>
+            </a:endParaRPr>
+          </a:p>
+        </p:txBody>
+      </p:sp>
+      <p:sp>
+        <p:nvSpPr>
+          <p:cNvPr id="3" name="Content Placeholder 2">
+            <a:extLst>
+              <a:ext uri="{FF2B5EF4-FFF2-40B4-BE49-F238E27FC236}">
+                <a16:creationId xmlns:a16="http://schemas.microsoft.com/office/drawing/2014/main" id="{464A2D37-3E87-584A-A0D4-8B6E512E9D7E}"/>
+              </a:ext>
+            </a:extLst>
+          </p:cNvPr>
+          <p:cNvSpPr>
+            <a:spLocks noGrp="1"/>
+          </p:cNvSpPr>
+          <p:nvPr>
+            <p:ph idx="1"/>
+          </p:nvPr>
+        </p:nvSpPr>
+        <p:spPr/>
+        <p:txBody>
+          <a:bodyPr/>
+          <a:lstStyle/>
+          <a:p>
+            <a:endParaRPr lang="en-US" dirty="0">
+              <a:latin typeface="Garamond" panose="02020404030301010803" pitchFamily="18" charset="0"/>
+            </a:endParaRPr>
+          </a:p>
+        </p:txBody>
+      </p:sp>
+    </p:spTree>
+    <p:extLst>
+      <p:ext uri="{BB962C8B-B14F-4D97-AF65-F5344CB8AC3E}">
+        <p14:creationId xmlns:p14="http://schemas.microsoft.com/office/powerpoint/2010/main" val="3391769610"/>
+      </p:ext>
+    </p:extLst>
+  </p:cSld>
+  <p:clrMapOvr>
+    <a:masterClrMapping/>
+  </p:clrMapOvr>
+</p:sld>
+</file>
+
+<file path=ppt/slides/slide18.xml><?xml version="1.0" encoding="utf-8"?>
+<p:sld xmlns:a="http://schemas.openxmlformats.org/drawingml/2006/main" xmlns:r="http://schemas.openxmlformats.org/officeDocument/2006/relationships" xmlns:p="http://schemas.openxmlformats.org/presentationml/2006/main">
+  <p:cSld>
+    <p:spTree>
+      <p:nvGrpSpPr>
+        <p:cNvPr id="1" name=""/>
+        <p:cNvGrpSpPr/>
+        <p:nvPr/>
+      </p:nvGrpSpPr>
+      <p:grpSpPr>
+        <a:xfrm>
+          <a:off x="0" y="0"/>
+          <a:ext cx="0" cy="0"/>
+          <a:chOff x="0" y="0"/>
+          <a:chExt cx="0" cy="0"/>
+        </a:xfrm>
+      </p:grpSpPr>
+      <p:sp>
+        <p:nvSpPr>
+          <p:cNvPr id="2" name="Title 1">
+            <a:extLst>
+              <a:ext uri="{FF2B5EF4-FFF2-40B4-BE49-F238E27FC236}">
+                <a16:creationId xmlns:a16="http://schemas.microsoft.com/office/drawing/2014/main" id="{5B6E373C-A14C-4341-BE1D-1568CFDA71A0}"/>
+              </a:ext>
+            </a:extLst>
+          </p:cNvPr>
+          <p:cNvSpPr>
+            <a:spLocks noGrp="1"/>
+          </p:cNvSpPr>
+          <p:nvPr>
+            <p:ph type="title"/>
+          </p:nvPr>
+        </p:nvSpPr>
+        <p:spPr>
+          <a:xfrm>
+            <a:off x="838199" y="365125"/>
+            <a:ext cx="11010499" cy="1325563"/>
+          </a:xfrm>
+        </p:spPr>
+        <p:txBody>
+          <a:bodyPr/>
+          <a:lstStyle/>
+          <a:p>
+            <a:endParaRPr lang="en-US" dirty="0">
+              <a:latin typeface="Garamond" panose="02020404030301010803" pitchFamily="18" charset="0"/>
+            </a:endParaRPr>
+          </a:p>
+        </p:txBody>
+      </p:sp>
+      <p:sp>
+        <p:nvSpPr>
+          <p:cNvPr id="3" name="Content Placeholder 2">
+            <a:extLst>
+              <a:ext uri="{FF2B5EF4-FFF2-40B4-BE49-F238E27FC236}">
+                <a16:creationId xmlns:a16="http://schemas.microsoft.com/office/drawing/2014/main" id="{464A2D37-3E87-584A-A0D4-8B6E512E9D7E}"/>
+              </a:ext>
+            </a:extLst>
+          </p:cNvPr>
+          <p:cNvSpPr>
+            <a:spLocks noGrp="1"/>
+          </p:cNvSpPr>
+          <p:nvPr>
+            <p:ph idx="1"/>
+          </p:nvPr>
+        </p:nvSpPr>
+        <p:spPr/>
+        <p:txBody>
+          <a:bodyPr/>
+          <a:lstStyle/>
+          <a:p>
+            <a:endParaRPr lang="en-US" dirty="0">
+              <a:latin typeface="Garamond" panose="02020404030301010803" pitchFamily="18" charset="0"/>
+            </a:endParaRPr>
+          </a:p>
+        </p:txBody>
+      </p:sp>
+    </p:spTree>
+    <p:extLst>
+      <p:ext uri="{BB962C8B-B14F-4D97-AF65-F5344CB8AC3E}">
+        <p14:creationId xmlns:p14="http://schemas.microsoft.com/office/powerpoint/2010/main" val="3555400520"/>
+      </p:ext>
+    </p:extLst>
+  </p:cSld>
+  <p:clrMapOvr>
+    <a:masterClrMapping/>
+  </p:clrMapOvr>
+</p:sld>
+</file>
+
+<file path=ppt/slides/slide19.xml><?xml version="1.0" encoding="utf-8"?>
+<p:sld xmlns:a="http://schemas.openxmlformats.org/drawingml/2006/main" xmlns:r="http://schemas.openxmlformats.org/officeDocument/2006/relationships" xmlns:p="http://schemas.openxmlformats.org/presentationml/2006/main">
+  <p:cSld>
+    <p:spTree>
+      <p:nvGrpSpPr>
+        <p:cNvPr id="1" name=""/>
+        <p:cNvGrpSpPr/>
+        <p:nvPr/>
+      </p:nvGrpSpPr>
+      <p:grpSpPr>
+        <a:xfrm>
+          <a:off x="0" y="0"/>
+          <a:ext cx="0" cy="0"/>
+          <a:chOff x="0" y="0"/>
+          <a:chExt cx="0" cy="0"/>
+        </a:xfrm>
+      </p:grpSpPr>
+      <p:sp>
+        <p:nvSpPr>
+          <p:cNvPr id="2" name="Title 1">
+            <a:extLst>
+              <a:ext uri="{FF2B5EF4-FFF2-40B4-BE49-F238E27FC236}">
+                <a16:creationId xmlns:a16="http://schemas.microsoft.com/office/drawing/2014/main" id="{5B6E373C-A14C-4341-BE1D-1568CFDA71A0}"/>
+              </a:ext>
+            </a:extLst>
+          </p:cNvPr>
+          <p:cNvSpPr>
+            <a:spLocks noGrp="1"/>
+          </p:cNvSpPr>
+          <p:nvPr>
+            <p:ph type="title"/>
+          </p:nvPr>
+        </p:nvSpPr>
+        <p:spPr>
+          <a:xfrm>
+            <a:off x="838199" y="365125"/>
+            <a:ext cx="11010499" cy="1325563"/>
+          </a:xfrm>
+        </p:spPr>
+        <p:txBody>
+          <a:bodyPr/>
+          <a:lstStyle/>
+          <a:p>
+            <a:endParaRPr lang="en-US" dirty="0">
+              <a:latin typeface="Garamond" panose="02020404030301010803" pitchFamily="18" charset="0"/>
+            </a:endParaRPr>
+          </a:p>
+        </p:txBody>
+      </p:sp>
+      <p:sp>
+        <p:nvSpPr>
+          <p:cNvPr id="3" name="Content Placeholder 2">
+            <a:extLst>
+              <a:ext uri="{FF2B5EF4-FFF2-40B4-BE49-F238E27FC236}">
+                <a16:creationId xmlns:a16="http://schemas.microsoft.com/office/drawing/2014/main" id="{464A2D37-3E87-584A-A0D4-8B6E512E9D7E}"/>
+              </a:ext>
+            </a:extLst>
+          </p:cNvPr>
+          <p:cNvSpPr>
+            <a:spLocks noGrp="1"/>
+          </p:cNvSpPr>
+          <p:nvPr>
+            <p:ph idx="1"/>
+          </p:nvPr>
+        </p:nvSpPr>
+        <p:spPr/>
+        <p:txBody>
+          <a:bodyPr/>
+          <a:lstStyle/>
+          <a:p>
+            <a:endParaRPr lang="en-US" dirty="0">
+              <a:latin typeface="Garamond" panose="02020404030301010803" pitchFamily="18" charset="0"/>
+            </a:endParaRPr>
+          </a:p>
+        </p:txBody>
+      </p:sp>
+    </p:spTree>
+    <p:extLst>
+      <p:ext uri="{BB962C8B-B14F-4D97-AF65-F5344CB8AC3E}">
+        <p14:creationId xmlns:p14="http://schemas.microsoft.com/office/powerpoint/2010/main" val="2278938997"/>
       </p:ext>
     </p:extLst>
   </p:cSld>
@@ -3587,9 +4580,36 @@
           <a:bodyPr/>
           <a:lstStyle/>
           <a:p>
-            <a:endParaRPr lang="en-US" dirty="0">
-              <a:latin typeface="Garamond" panose="02020404030301010803" pitchFamily="18" charset="0"/>
-            </a:endParaRPr>
+            <a:r>
+              <a:rPr lang="en-US" dirty="0">
+                <a:latin typeface="Garamond" panose="02020404030301010803" pitchFamily="18" charset="0"/>
+              </a:rPr>
+              <a:t>Introduction </a:t>
+            </a:r>
+          </a:p>
+          <a:p>
+            <a:r>
+              <a:rPr lang="en-US" dirty="0">
+                <a:latin typeface="Garamond" panose="02020404030301010803" pitchFamily="18" charset="0"/>
+              </a:rPr>
+              <a:t>Research Question</a:t>
+            </a:r>
+          </a:p>
+          <a:p>
+            <a:r>
+              <a:rPr lang="en-US" dirty="0">
+                <a:latin typeface="Garamond" panose="02020404030301010803" pitchFamily="18" charset="0"/>
+              </a:rPr>
+              <a:t>Preliminary Results</a:t>
+            </a:r>
+          </a:p>
+          <a:p>
+            <a:r>
+              <a:rPr lang="en-US" dirty="0">
+                <a:latin typeface="Garamond" panose="02020404030301010803" pitchFamily="18" charset="0"/>
+              </a:rPr>
+              <a:t>Specific Aims</a:t>
+            </a:r>
           </a:p>
         </p:txBody>
       </p:sp>
@@ -3597,6 +4617,1275 @@
     <p:extLst>
       <p:ext uri="{BB962C8B-B14F-4D97-AF65-F5344CB8AC3E}">
         <p14:creationId xmlns:p14="http://schemas.microsoft.com/office/powerpoint/2010/main" val="3815720697"/>
+      </p:ext>
+    </p:extLst>
+  </p:cSld>
+  <p:clrMapOvr>
+    <a:masterClrMapping/>
+  </p:clrMapOvr>
+</p:sld>
+</file>
+
+<file path=ppt/slides/slide20.xml><?xml version="1.0" encoding="utf-8"?>
+<p:sld xmlns:a="http://schemas.openxmlformats.org/drawingml/2006/main" xmlns:r="http://schemas.openxmlformats.org/officeDocument/2006/relationships" xmlns:p="http://schemas.openxmlformats.org/presentationml/2006/main">
+  <p:cSld>
+    <p:spTree>
+      <p:nvGrpSpPr>
+        <p:cNvPr id="1" name=""/>
+        <p:cNvGrpSpPr/>
+        <p:nvPr/>
+      </p:nvGrpSpPr>
+      <p:grpSpPr>
+        <a:xfrm>
+          <a:off x="0" y="0"/>
+          <a:ext cx="0" cy="0"/>
+          <a:chOff x="0" y="0"/>
+          <a:chExt cx="0" cy="0"/>
+        </a:xfrm>
+      </p:grpSpPr>
+      <p:sp>
+        <p:nvSpPr>
+          <p:cNvPr id="2" name="Title 1">
+            <a:extLst>
+              <a:ext uri="{FF2B5EF4-FFF2-40B4-BE49-F238E27FC236}">
+                <a16:creationId xmlns:a16="http://schemas.microsoft.com/office/drawing/2014/main" id="{5B6E373C-A14C-4341-BE1D-1568CFDA71A0}"/>
+              </a:ext>
+            </a:extLst>
+          </p:cNvPr>
+          <p:cNvSpPr>
+            <a:spLocks noGrp="1"/>
+          </p:cNvSpPr>
+          <p:nvPr>
+            <p:ph type="title"/>
+          </p:nvPr>
+        </p:nvSpPr>
+        <p:spPr>
+          <a:xfrm>
+            <a:off x="838199" y="365125"/>
+            <a:ext cx="11010499" cy="1325563"/>
+          </a:xfrm>
+        </p:spPr>
+        <p:txBody>
+          <a:bodyPr/>
+          <a:lstStyle/>
+          <a:p>
+            <a:endParaRPr lang="en-US" dirty="0">
+              <a:latin typeface="Garamond" panose="02020404030301010803" pitchFamily="18" charset="0"/>
+            </a:endParaRPr>
+          </a:p>
+        </p:txBody>
+      </p:sp>
+      <p:sp>
+        <p:nvSpPr>
+          <p:cNvPr id="3" name="Content Placeholder 2">
+            <a:extLst>
+              <a:ext uri="{FF2B5EF4-FFF2-40B4-BE49-F238E27FC236}">
+                <a16:creationId xmlns:a16="http://schemas.microsoft.com/office/drawing/2014/main" id="{464A2D37-3E87-584A-A0D4-8B6E512E9D7E}"/>
+              </a:ext>
+            </a:extLst>
+          </p:cNvPr>
+          <p:cNvSpPr>
+            <a:spLocks noGrp="1"/>
+          </p:cNvSpPr>
+          <p:nvPr>
+            <p:ph idx="1"/>
+          </p:nvPr>
+        </p:nvSpPr>
+        <p:spPr/>
+        <p:txBody>
+          <a:bodyPr/>
+          <a:lstStyle/>
+          <a:p>
+            <a:endParaRPr lang="en-US" dirty="0">
+              <a:latin typeface="Garamond" panose="02020404030301010803" pitchFamily="18" charset="0"/>
+            </a:endParaRPr>
+          </a:p>
+        </p:txBody>
+      </p:sp>
+    </p:spTree>
+    <p:extLst>
+      <p:ext uri="{BB962C8B-B14F-4D97-AF65-F5344CB8AC3E}">
+        <p14:creationId xmlns:p14="http://schemas.microsoft.com/office/powerpoint/2010/main" val="3710752045"/>
+      </p:ext>
+    </p:extLst>
+  </p:cSld>
+  <p:clrMapOvr>
+    <a:masterClrMapping/>
+  </p:clrMapOvr>
+</p:sld>
+</file>
+
+<file path=ppt/slides/slide3.xml><?xml version="1.0" encoding="utf-8"?>
+<p:sld xmlns:a="http://schemas.openxmlformats.org/drawingml/2006/main" xmlns:r="http://schemas.openxmlformats.org/officeDocument/2006/relationships" xmlns:p="http://schemas.openxmlformats.org/presentationml/2006/main">
+  <p:cSld>
+    <p:spTree>
+      <p:nvGrpSpPr>
+        <p:cNvPr id="1" name=""/>
+        <p:cNvGrpSpPr/>
+        <p:nvPr/>
+      </p:nvGrpSpPr>
+      <p:grpSpPr>
+        <a:xfrm>
+          <a:off x="0" y="0"/>
+          <a:ext cx="0" cy="0"/>
+          <a:chOff x="0" y="0"/>
+          <a:chExt cx="0" cy="0"/>
+        </a:xfrm>
+      </p:grpSpPr>
+      <p:sp>
+        <p:nvSpPr>
+          <p:cNvPr id="2" name="Title 1">
+            <a:extLst>
+              <a:ext uri="{FF2B5EF4-FFF2-40B4-BE49-F238E27FC236}">
+                <a16:creationId xmlns:a16="http://schemas.microsoft.com/office/drawing/2014/main" id="{5B6E373C-A14C-4341-BE1D-1568CFDA71A0}"/>
+              </a:ext>
+            </a:extLst>
+          </p:cNvPr>
+          <p:cNvSpPr>
+            <a:spLocks noGrp="1"/>
+          </p:cNvSpPr>
+          <p:nvPr>
+            <p:ph type="title"/>
+          </p:nvPr>
+        </p:nvSpPr>
+        <p:spPr>
+          <a:xfrm>
+            <a:off x="838199" y="365125"/>
+            <a:ext cx="11164503" cy="1325563"/>
+          </a:xfrm>
+        </p:spPr>
+        <p:txBody>
+          <a:bodyPr/>
+          <a:lstStyle/>
+          <a:p>
+            <a:r>
+              <a:rPr lang="en-US" i="1" dirty="0">
+                <a:latin typeface="Garamond" panose="02020404030301010803" pitchFamily="18" charset="0"/>
+              </a:rPr>
+              <a:t>Mycobacterium </a:t>
+            </a:r>
+            <a:r>
+              <a:rPr lang="en-US" i="1" dirty="0" err="1">
+                <a:latin typeface="Garamond" panose="02020404030301010803" pitchFamily="18" charset="0"/>
+              </a:rPr>
+              <a:t>bovis</a:t>
+            </a:r>
+            <a:r>
+              <a:rPr lang="en-US" i="1" dirty="0">
+                <a:latin typeface="Garamond" panose="02020404030301010803" pitchFamily="18" charset="0"/>
+              </a:rPr>
+              <a:t> – </a:t>
+            </a:r>
+            <a:r>
+              <a:rPr lang="en-US" dirty="0">
+                <a:latin typeface="Garamond" panose="02020404030301010803" pitchFamily="18" charset="0"/>
+              </a:rPr>
+              <a:t>Quick Facts</a:t>
+            </a:r>
+            <a:endParaRPr lang="en-US" i="1" dirty="0">
+              <a:latin typeface="Garamond" panose="02020404030301010803" pitchFamily="18" charset="0"/>
+            </a:endParaRPr>
+          </a:p>
+        </p:txBody>
+      </p:sp>
+      <p:sp>
+        <p:nvSpPr>
+          <p:cNvPr id="3" name="Content Placeholder 2">
+            <a:extLst>
+              <a:ext uri="{FF2B5EF4-FFF2-40B4-BE49-F238E27FC236}">
+                <a16:creationId xmlns:a16="http://schemas.microsoft.com/office/drawing/2014/main" id="{464A2D37-3E87-584A-A0D4-8B6E512E9D7E}"/>
+              </a:ext>
+            </a:extLst>
+          </p:cNvPr>
+          <p:cNvSpPr>
+            <a:spLocks noGrp="1"/>
+          </p:cNvSpPr>
+          <p:nvPr>
+            <p:ph idx="1"/>
+          </p:nvPr>
+        </p:nvSpPr>
+        <p:spPr/>
+        <p:txBody>
+          <a:bodyPr/>
+          <a:lstStyle/>
+          <a:p>
+            <a:r>
+              <a:rPr lang="en-US" i="1" dirty="0">
+                <a:latin typeface="Garamond" panose="02020404030301010803" pitchFamily="18" charset="0"/>
+              </a:rPr>
+              <a:t>Mycobacterium </a:t>
+            </a:r>
+            <a:r>
+              <a:rPr lang="en-US" i="1" dirty="0" err="1">
+                <a:latin typeface="Garamond" panose="02020404030301010803" pitchFamily="18" charset="0"/>
+              </a:rPr>
+              <a:t>bovis</a:t>
+            </a:r>
+            <a:r>
+              <a:rPr lang="en-US" dirty="0">
+                <a:latin typeface="Garamond" panose="02020404030301010803" pitchFamily="18" charset="0"/>
+              </a:rPr>
+              <a:t> is the bacterial pathogen that causes bovine tuberculosis (</a:t>
+            </a:r>
+            <a:r>
+              <a:rPr lang="en-US" dirty="0" err="1">
+                <a:latin typeface="Garamond" panose="02020404030301010803" pitchFamily="18" charset="0"/>
+              </a:rPr>
+              <a:t>bTB</a:t>
+            </a:r>
+            <a:r>
+              <a:rPr lang="en-US" dirty="0">
+                <a:latin typeface="Garamond" panose="02020404030301010803" pitchFamily="18" charset="0"/>
+              </a:rPr>
+              <a:t>)</a:t>
+            </a:r>
+          </a:p>
+          <a:p>
+            <a:pPr lvl="1"/>
+            <a:r>
+              <a:rPr lang="en-US" dirty="0">
+                <a:latin typeface="Garamond" panose="02020404030301010803" pitchFamily="18" charset="0"/>
+              </a:rPr>
+              <a:t>Chronic respiratory complications, weight loss, and lymphatic and lung lesions</a:t>
+            </a:r>
+          </a:p>
+          <a:p>
+            <a:pPr lvl="1"/>
+            <a:r>
+              <a:rPr lang="en-US" dirty="0">
+                <a:latin typeface="Garamond" panose="02020404030301010803" pitchFamily="18" charset="0"/>
+              </a:rPr>
+              <a:t>Contracted through multiple avenues, mainly inhalation of aerosols</a:t>
+            </a:r>
+          </a:p>
+          <a:p>
+            <a:pPr lvl="1"/>
+            <a:r>
+              <a:rPr lang="en-US" dirty="0">
+                <a:latin typeface="Garamond" panose="02020404030301010803" pitchFamily="18" charset="0"/>
+              </a:rPr>
+              <a:t>Animal adapted, limited human – human transmission</a:t>
+            </a:r>
+          </a:p>
+          <a:p>
+            <a:pPr lvl="1"/>
+            <a:r>
+              <a:rPr lang="en-US" dirty="0">
+                <a:latin typeface="Garamond" panose="02020404030301010803" pitchFamily="18" charset="0"/>
+              </a:rPr>
+              <a:t>Highly related to </a:t>
+            </a:r>
+            <a:r>
+              <a:rPr lang="en-US" i="1" dirty="0">
+                <a:latin typeface="Garamond" panose="02020404030301010803" pitchFamily="18" charset="0"/>
+              </a:rPr>
+              <a:t>Mycobacterium tuberculosis </a:t>
+            </a:r>
+            <a:r>
+              <a:rPr lang="en-US" dirty="0">
+                <a:latin typeface="Garamond" panose="02020404030301010803" pitchFamily="18" charset="0"/>
+              </a:rPr>
+              <a:t>complex (MTBC) species</a:t>
+            </a:r>
+          </a:p>
+          <a:p>
+            <a:pPr marL="457200" lvl="1" indent="0">
+              <a:buNone/>
+            </a:pPr>
+            <a:endParaRPr lang="en-US" dirty="0">
+              <a:latin typeface="Garamond" panose="02020404030301010803" pitchFamily="18" charset="0"/>
+            </a:endParaRPr>
+          </a:p>
+        </p:txBody>
+      </p:sp>
+    </p:spTree>
+    <p:extLst>
+      <p:ext uri="{BB962C8B-B14F-4D97-AF65-F5344CB8AC3E}">
+        <p14:creationId xmlns:p14="http://schemas.microsoft.com/office/powerpoint/2010/main" val="2717509443"/>
+      </p:ext>
+    </p:extLst>
+  </p:cSld>
+  <p:clrMapOvr>
+    <a:masterClrMapping/>
+  </p:clrMapOvr>
+</p:sld>
+</file>
+
+<file path=ppt/slides/slide4.xml><?xml version="1.0" encoding="utf-8"?>
+<p:sld xmlns:a="http://schemas.openxmlformats.org/drawingml/2006/main" xmlns:r="http://schemas.openxmlformats.org/officeDocument/2006/relationships" xmlns:p="http://schemas.openxmlformats.org/presentationml/2006/main">
+  <p:cSld>
+    <p:spTree>
+      <p:nvGrpSpPr>
+        <p:cNvPr id="1" name=""/>
+        <p:cNvGrpSpPr/>
+        <p:nvPr/>
+      </p:nvGrpSpPr>
+      <p:grpSpPr>
+        <a:xfrm>
+          <a:off x="0" y="0"/>
+          <a:ext cx="0" cy="0"/>
+          <a:chOff x="0" y="0"/>
+          <a:chExt cx="0" cy="0"/>
+        </a:xfrm>
+      </p:grpSpPr>
+      <p:sp>
+        <p:nvSpPr>
+          <p:cNvPr id="2" name="Title 1">
+            <a:extLst>
+              <a:ext uri="{FF2B5EF4-FFF2-40B4-BE49-F238E27FC236}">
+                <a16:creationId xmlns:a16="http://schemas.microsoft.com/office/drawing/2014/main" id="{5B6E373C-A14C-4341-BE1D-1568CFDA71A0}"/>
+              </a:ext>
+            </a:extLst>
+          </p:cNvPr>
+          <p:cNvSpPr>
+            <a:spLocks noGrp="1"/>
+          </p:cNvSpPr>
+          <p:nvPr>
+            <p:ph type="title"/>
+          </p:nvPr>
+        </p:nvSpPr>
+        <p:spPr>
+          <a:xfrm>
+            <a:off x="838199" y="365125"/>
+            <a:ext cx="11010499" cy="1325563"/>
+          </a:xfrm>
+        </p:spPr>
+        <p:txBody>
+          <a:bodyPr/>
+          <a:lstStyle/>
+          <a:p>
+            <a:r>
+              <a:rPr lang="en-US" i="1" dirty="0">
+                <a:latin typeface="Garamond" panose="02020404030301010803" pitchFamily="18" charset="0"/>
+              </a:rPr>
+              <a:t>M. </a:t>
+            </a:r>
+            <a:r>
+              <a:rPr lang="en-US" i="1" dirty="0" err="1">
+                <a:latin typeface="Garamond" panose="02020404030301010803" pitchFamily="18" charset="0"/>
+              </a:rPr>
+              <a:t>bovis</a:t>
+            </a:r>
+            <a:r>
+              <a:rPr lang="en-US" i="1" dirty="0">
+                <a:latin typeface="Garamond" panose="02020404030301010803" pitchFamily="18" charset="0"/>
+              </a:rPr>
+              <a:t> s</a:t>
+            </a:r>
+            <a:r>
+              <a:rPr lang="en-US" dirty="0">
+                <a:latin typeface="Garamond" panose="02020404030301010803" pitchFamily="18" charset="0"/>
+              </a:rPr>
+              <a:t>pillback leads to economic burden</a:t>
+            </a:r>
+            <a:endParaRPr lang="en-US" i="1" dirty="0">
+              <a:latin typeface="Garamond" panose="02020404030301010803" pitchFamily="18" charset="0"/>
+            </a:endParaRPr>
+          </a:p>
+        </p:txBody>
+      </p:sp>
+      <p:sp>
+        <p:nvSpPr>
+          <p:cNvPr id="3" name="Content Placeholder 2">
+            <a:extLst>
+              <a:ext uri="{FF2B5EF4-FFF2-40B4-BE49-F238E27FC236}">
+                <a16:creationId xmlns:a16="http://schemas.microsoft.com/office/drawing/2014/main" id="{464A2D37-3E87-584A-A0D4-8B6E512E9D7E}"/>
+              </a:ext>
+            </a:extLst>
+          </p:cNvPr>
+          <p:cNvSpPr>
+            <a:spLocks noGrp="1"/>
+          </p:cNvSpPr>
+          <p:nvPr>
+            <p:ph idx="1"/>
+          </p:nvPr>
+        </p:nvSpPr>
+        <p:spPr/>
+        <p:txBody>
+          <a:bodyPr>
+            <a:normAutofit fontScale="92500"/>
+          </a:bodyPr>
+          <a:lstStyle/>
+          <a:p>
+            <a:r>
+              <a:rPr lang="en-US" dirty="0">
+                <a:latin typeface="Garamond" panose="02020404030301010803" pitchFamily="18" charset="0"/>
+              </a:rPr>
+              <a:t>Implicated as a bacterial pathogen that exists on the </a:t>
+            </a:r>
+            <a:r>
+              <a:rPr lang="en-US" b="1" dirty="0">
+                <a:latin typeface="Garamond" panose="02020404030301010803" pitchFamily="18" charset="0"/>
+              </a:rPr>
+              <a:t>wildlife-livestock interface.</a:t>
+            </a:r>
+          </a:p>
+          <a:p>
+            <a:pPr marL="914400" lvl="1" indent="-457200">
+              <a:buFont typeface="+mj-lt"/>
+              <a:buAutoNum type="arabicPeriod"/>
+            </a:pPr>
+            <a:r>
+              <a:rPr lang="en-US" dirty="0">
+                <a:latin typeface="Garamond" panose="02020404030301010803" pitchFamily="18" charset="0"/>
+              </a:rPr>
+              <a:t>Spillover into wildlife population from infected cattle.</a:t>
+            </a:r>
+          </a:p>
+          <a:p>
+            <a:pPr marL="914400" lvl="1" indent="-457200">
+              <a:buFont typeface="+mj-lt"/>
+              <a:buAutoNum type="arabicPeriod"/>
+            </a:pPr>
+            <a:r>
+              <a:rPr lang="en-US" dirty="0">
+                <a:latin typeface="Garamond" panose="02020404030301010803" pitchFamily="18" charset="0"/>
+              </a:rPr>
+              <a:t>Creation of maintenance population in the wildlife.</a:t>
+            </a:r>
+          </a:p>
+          <a:p>
+            <a:pPr marL="914400" lvl="1" indent="-457200">
+              <a:buFont typeface="+mj-lt"/>
+              <a:buAutoNum type="arabicPeriod"/>
+            </a:pPr>
+            <a:r>
+              <a:rPr lang="en-US" dirty="0">
+                <a:latin typeface="Garamond" panose="02020404030301010803" pitchFamily="18" charset="0"/>
+              </a:rPr>
+              <a:t>Finally, spillback into the economically valuable livestock population.</a:t>
+            </a:r>
+          </a:p>
+          <a:p>
+            <a:r>
+              <a:rPr lang="en-US" dirty="0">
+                <a:latin typeface="Garamond" panose="02020404030301010803" pitchFamily="18" charset="0"/>
+              </a:rPr>
+              <a:t>Spillover can lead to formation of two opposite outcomes:</a:t>
+            </a:r>
+          </a:p>
+          <a:p>
+            <a:pPr marL="914400" lvl="1" indent="-457200">
+              <a:buFont typeface="+mj-lt"/>
+              <a:buAutoNum type="arabicPeriod"/>
+            </a:pPr>
+            <a:r>
+              <a:rPr lang="en-US" dirty="0">
+                <a:latin typeface="Garamond" panose="02020404030301010803" pitchFamily="18" charset="0"/>
+              </a:rPr>
+              <a:t>Maintenance populations: transmission within the species population can be sustained</a:t>
+            </a:r>
+          </a:p>
+          <a:p>
+            <a:pPr marL="914400" lvl="1" indent="-457200">
+              <a:buFont typeface="+mj-lt"/>
+              <a:buAutoNum type="arabicPeriod"/>
+            </a:pPr>
+            <a:r>
+              <a:rPr lang="en-US" dirty="0">
+                <a:latin typeface="Garamond" panose="02020404030301010803" pitchFamily="18" charset="0"/>
+              </a:rPr>
+              <a:t>Dead-End hosts: transmission of disease occurs rarely within a species population</a:t>
+            </a:r>
+          </a:p>
+          <a:p>
+            <a:r>
+              <a:rPr lang="en-US" dirty="0">
+                <a:latin typeface="Garamond" panose="02020404030301010803" pitchFamily="18" charset="0"/>
+              </a:rPr>
+              <a:t>Maintenance populations that contribute to constant spillback are the focus of disease control programs.</a:t>
+            </a:r>
+          </a:p>
+          <a:p>
+            <a:pPr lvl="2"/>
+            <a:endParaRPr lang="en-US" dirty="0">
+              <a:latin typeface="Garamond" panose="02020404030301010803" pitchFamily="18" charset="0"/>
+            </a:endParaRPr>
+          </a:p>
+        </p:txBody>
+      </p:sp>
+    </p:spTree>
+    <p:extLst>
+      <p:ext uri="{BB962C8B-B14F-4D97-AF65-F5344CB8AC3E}">
+        <p14:creationId xmlns:p14="http://schemas.microsoft.com/office/powerpoint/2010/main" val="3360728479"/>
+      </p:ext>
+    </p:extLst>
+  </p:cSld>
+  <p:clrMapOvr>
+    <a:masterClrMapping/>
+  </p:clrMapOvr>
+</p:sld>
+</file>
+
+<file path=ppt/slides/slide5.xml><?xml version="1.0" encoding="utf-8"?>
+<p:sld xmlns:a="http://schemas.openxmlformats.org/drawingml/2006/main" xmlns:r="http://schemas.openxmlformats.org/officeDocument/2006/relationships" xmlns:p="http://schemas.openxmlformats.org/presentationml/2006/main">
+  <p:cSld>
+    <p:spTree>
+      <p:nvGrpSpPr>
+        <p:cNvPr id="1" name=""/>
+        <p:cNvGrpSpPr/>
+        <p:nvPr/>
+      </p:nvGrpSpPr>
+      <p:grpSpPr>
+        <a:xfrm>
+          <a:off x="0" y="0"/>
+          <a:ext cx="0" cy="0"/>
+          <a:chOff x="0" y="0"/>
+          <a:chExt cx="0" cy="0"/>
+        </a:xfrm>
+      </p:grpSpPr>
+      <p:sp>
+        <p:nvSpPr>
+          <p:cNvPr id="2" name="Title 1">
+            <a:extLst>
+              <a:ext uri="{FF2B5EF4-FFF2-40B4-BE49-F238E27FC236}">
+                <a16:creationId xmlns:a16="http://schemas.microsoft.com/office/drawing/2014/main" id="{5B6E373C-A14C-4341-BE1D-1568CFDA71A0}"/>
+              </a:ext>
+            </a:extLst>
+          </p:cNvPr>
+          <p:cNvSpPr>
+            <a:spLocks noGrp="1"/>
+          </p:cNvSpPr>
+          <p:nvPr>
+            <p:ph type="title"/>
+          </p:nvPr>
+        </p:nvSpPr>
+        <p:spPr>
+          <a:xfrm>
+            <a:off x="838199" y="365125"/>
+            <a:ext cx="11010499" cy="1325563"/>
+          </a:xfrm>
+        </p:spPr>
+        <p:txBody>
+          <a:bodyPr/>
+          <a:lstStyle/>
+          <a:p>
+            <a:r>
+              <a:rPr lang="en-US" dirty="0">
+                <a:latin typeface="Garamond" panose="02020404030301010803" pitchFamily="18" charset="0"/>
+              </a:rPr>
+              <a:t>Whole Genome Sequencing for </a:t>
+            </a:r>
+            <a:r>
+              <a:rPr lang="en-US" dirty="0" err="1">
+                <a:latin typeface="Garamond" panose="02020404030301010803" pitchFamily="18" charset="0"/>
+              </a:rPr>
+              <a:t>bTB</a:t>
+            </a:r>
+            <a:r>
+              <a:rPr lang="en-US" dirty="0">
+                <a:latin typeface="Garamond" panose="02020404030301010803" pitchFamily="18" charset="0"/>
+              </a:rPr>
+              <a:t> surveillance</a:t>
+            </a:r>
+          </a:p>
+        </p:txBody>
+      </p:sp>
+      <p:sp>
+        <p:nvSpPr>
+          <p:cNvPr id="3" name="Content Placeholder 2">
+            <a:extLst>
+              <a:ext uri="{FF2B5EF4-FFF2-40B4-BE49-F238E27FC236}">
+                <a16:creationId xmlns:a16="http://schemas.microsoft.com/office/drawing/2014/main" id="{464A2D37-3E87-584A-A0D4-8B6E512E9D7E}"/>
+              </a:ext>
+            </a:extLst>
+          </p:cNvPr>
+          <p:cNvSpPr>
+            <a:spLocks noGrp="1"/>
+          </p:cNvSpPr>
+          <p:nvPr>
+            <p:ph idx="1"/>
+          </p:nvPr>
+        </p:nvSpPr>
+        <p:spPr/>
+        <p:txBody>
+          <a:bodyPr/>
+          <a:lstStyle/>
+          <a:p>
+            <a:r>
+              <a:rPr lang="en-US" dirty="0">
+                <a:latin typeface="Garamond" panose="02020404030301010803" pitchFamily="18" charset="0"/>
+              </a:rPr>
+              <a:t>Whole Genome Sequencing (WGS) is utilized to track changes in individual nucleotides.</a:t>
+            </a:r>
+          </a:p>
+          <a:p>
+            <a:pPr lvl="1"/>
+            <a:r>
+              <a:rPr lang="en-US" dirty="0">
+                <a:latin typeface="Garamond" panose="02020404030301010803" pitchFamily="18" charset="0"/>
+              </a:rPr>
+              <a:t>Compare to an established reference genome.</a:t>
+            </a:r>
+          </a:p>
+          <a:p>
+            <a:r>
+              <a:rPr lang="en-US" dirty="0">
+                <a:latin typeface="Garamond" panose="02020404030301010803" pitchFamily="18" charset="0"/>
+              </a:rPr>
+              <a:t>Mutations in the </a:t>
+            </a:r>
+            <a:r>
+              <a:rPr lang="en-US" i="1" dirty="0">
+                <a:latin typeface="Garamond" panose="02020404030301010803" pitchFamily="18" charset="0"/>
+              </a:rPr>
+              <a:t>M. </a:t>
+            </a:r>
+            <a:r>
+              <a:rPr lang="en-US" i="1" dirty="0" err="1">
+                <a:latin typeface="Garamond" panose="02020404030301010803" pitchFamily="18" charset="0"/>
+              </a:rPr>
+              <a:t>bovis</a:t>
+            </a:r>
+            <a:r>
+              <a:rPr lang="en-US" i="1" dirty="0">
+                <a:latin typeface="Garamond" panose="02020404030301010803" pitchFamily="18" charset="0"/>
+              </a:rPr>
+              <a:t> </a:t>
+            </a:r>
+            <a:r>
+              <a:rPr lang="en-US" dirty="0">
+                <a:latin typeface="Garamond" panose="02020404030301010803" pitchFamily="18" charset="0"/>
+              </a:rPr>
+              <a:t>genome can accumulate in a time frame that can be observable over a few years.</a:t>
+            </a:r>
+          </a:p>
+          <a:p>
+            <a:pPr lvl="1"/>
+            <a:r>
+              <a:rPr lang="en-US" i="1" dirty="0">
+                <a:latin typeface="Garamond" panose="02020404030301010803" pitchFamily="18" charset="0"/>
+              </a:rPr>
+              <a:t>M. </a:t>
+            </a:r>
+            <a:r>
+              <a:rPr lang="en-US" i="1" dirty="0" err="1">
+                <a:latin typeface="Garamond" panose="02020404030301010803" pitchFamily="18" charset="0"/>
+              </a:rPr>
+              <a:t>bovis</a:t>
+            </a:r>
+            <a:r>
+              <a:rPr lang="en-US" i="1" dirty="0">
+                <a:latin typeface="Garamond" panose="02020404030301010803" pitchFamily="18" charset="0"/>
+              </a:rPr>
+              <a:t> </a:t>
+            </a:r>
+            <a:r>
+              <a:rPr lang="en-US" dirty="0">
+                <a:latin typeface="Garamond" panose="02020404030301010803" pitchFamily="18" charset="0"/>
+              </a:rPr>
+              <a:t>Genetic similarity ~ Transmission dynamics</a:t>
+            </a:r>
+          </a:p>
+          <a:p>
+            <a:r>
+              <a:rPr lang="en-US" dirty="0">
+                <a:latin typeface="Garamond" panose="02020404030301010803" pitchFamily="18" charset="0"/>
+              </a:rPr>
+              <a:t>The combination of genomic, temporal, spatial, and host metadata for a single </a:t>
+            </a:r>
+            <a:r>
+              <a:rPr lang="en-US" i="1" dirty="0">
+                <a:latin typeface="Garamond" panose="02020404030301010803" pitchFamily="18" charset="0"/>
+              </a:rPr>
+              <a:t>M. </a:t>
+            </a:r>
+            <a:r>
+              <a:rPr lang="en-US" i="1" dirty="0" err="1">
+                <a:latin typeface="Garamond" panose="02020404030301010803" pitchFamily="18" charset="0"/>
+              </a:rPr>
+              <a:t>bovis</a:t>
+            </a:r>
+            <a:r>
+              <a:rPr lang="en-US" i="1" dirty="0">
+                <a:latin typeface="Garamond" panose="02020404030301010803" pitchFamily="18" charset="0"/>
+              </a:rPr>
+              <a:t> </a:t>
+            </a:r>
+            <a:r>
+              <a:rPr lang="en-US" dirty="0">
+                <a:latin typeface="Garamond" panose="02020404030301010803" pitchFamily="18" charset="0"/>
+              </a:rPr>
+              <a:t>isolate help to define these dynamics.</a:t>
+            </a:r>
+          </a:p>
+          <a:p>
+            <a:endParaRPr lang="en-US" dirty="0">
+              <a:latin typeface="Garamond" panose="02020404030301010803" pitchFamily="18" charset="0"/>
+            </a:endParaRPr>
+          </a:p>
+        </p:txBody>
+      </p:sp>
+    </p:spTree>
+    <p:extLst>
+      <p:ext uri="{BB962C8B-B14F-4D97-AF65-F5344CB8AC3E}">
+        <p14:creationId xmlns:p14="http://schemas.microsoft.com/office/powerpoint/2010/main" val="3774134821"/>
+      </p:ext>
+    </p:extLst>
+  </p:cSld>
+  <p:clrMapOvr>
+    <a:masterClrMapping/>
+  </p:clrMapOvr>
+</p:sld>
+</file>
+
+<file path=ppt/slides/slide6.xml><?xml version="1.0" encoding="utf-8"?>
+<p:sld xmlns:a="http://schemas.openxmlformats.org/drawingml/2006/main" xmlns:r="http://schemas.openxmlformats.org/officeDocument/2006/relationships" xmlns:p="http://schemas.openxmlformats.org/presentationml/2006/main">
+  <p:cSld>
+    <p:spTree>
+      <p:nvGrpSpPr>
+        <p:cNvPr id="1" name=""/>
+        <p:cNvGrpSpPr/>
+        <p:nvPr/>
+      </p:nvGrpSpPr>
+      <p:grpSpPr>
+        <a:xfrm>
+          <a:off x="0" y="0"/>
+          <a:ext cx="0" cy="0"/>
+          <a:chOff x="0" y="0"/>
+          <a:chExt cx="0" cy="0"/>
+        </a:xfrm>
+      </p:grpSpPr>
+      <p:sp>
+        <p:nvSpPr>
+          <p:cNvPr id="2" name="Title 1">
+            <a:extLst>
+              <a:ext uri="{FF2B5EF4-FFF2-40B4-BE49-F238E27FC236}">
+                <a16:creationId xmlns:a16="http://schemas.microsoft.com/office/drawing/2014/main" id="{5B6E373C-A14C-4341-BE1D-1568CFDA71A0}"/>
+              </a:ext>
+            </a:extLst>
+          </p:cNvPr>
+          <p:cNvSpPr>
+            <a:spLocks noGrp="1"/>
+          </p:cNvSpPr>
+          <p:nvPr>
+            <p:ph type="title"/>
+          </p:nvPr>
+        </p:nvSpPr>
+        <p:spPr>
+          <a:xfrm>
+            <a:off x="838199" y="365125"/>
+            <a:ext cx="11010499" cy="1325563"/>
+          </a:xfrm>
+        </p:spPr>
+        <p:txBody>
+          <a:bodyPr/>
+          <a:lstStyle/>
+          <a:p>
+            <a:r>
+              <a:rPr lang="en-US" dirty="0">
+                <a:latin typeface="Garamond" panose="02020404030301010803" pitchFamily="18" charset="0"/>
+              </a:rPr>
+              <a:t>Research Question</a:t>
+            </a:r>
+          </a:p>
+        </p:txBody>
+      </p:sp>
+      <p:sp>
+        <p:nvSpPr>
+          <p:cNvPr id="3" name="Content Placeholder 2">
+            <a:extLst>
+              <a:ext uri="{FF2B5EF4-FFF2-40B4-BE49-F238E27FC236}">
+                <a16:creationId xmlns:a16="http://schemas.microsoft.com/office/drawing/2014/main" id="{464A2D37-3E87-584A-A0D4-8B6E512E9D7E}"/>
+              </a:ext>
+            </a:extLst>
+          </p:cNvPr>
+          <p:cNvSpPr>
+            <a:spLocks noGrp="1"/>
+          </p:cNvSpPr>
+          <p:nvPr>
+            <p:ph idx="1"/>
+          </p:nvPr>
+        </p:nvSpPr>
+        <p:spPr/>
+        <p:txBody>
+          <a:bodyPr/>
+          <a:lstStyle/>
+          <a:p>
+            <a:r>
+              <a:rPr lang="en-US" dirty="0">
+                <a:latin typeface="Garamond" panose="02020404030301010803" pitchFamily="18" charset="0"/>
+              </a:rPr>
+              <a:t>The transmission dynamics between maintenance hosts and dead-end hosts are fluid and fundamentally different. This suggests:</a:t>
+            </a:r>
+          </a:p>
+          <a:p>
+            <a:pPr lvl="1"/>
+            <a:r>
+              <a:rPr lang="en-US" dirty="0">
+                <a:latin typeface="Garamond" panose="02020404030301010803" pitchFamily="18" charset="0"/>
+              </a:rPr>
+              <a:t>Genomic changes on the population level within a maintenance host population should accumulate. </a:t>
+            </a:r>
+          </a:p>
+          <a:p>
+            <a:pPr lvl="1"/>
+            <a:r>
+              <a:rPr lang="en-US" dirty="0">
+                <a:latin typeface="Garamond" panose="02020404030301010803" pitchFamily="18" charset="0"/>
+              </a:rPr>
+              <a:t>Anthropogenic, agricultural, and ecological factors might influence transmission dynamics.</a:t>
+            </a:r>
+          </a:p>
+          <a:p>
+            <a:r>
+              <a:rPr lang="en-US" b="1" dirty="0">
+                <a:latin typeface="Garamond" panose="02020404030301010803" pitchFamily="18" charset="0"/>
+              </a:rPr>
+              <a:t>Can analysis of the genomic variability of </a:t>
+            </a:r>
+            <a:r>
+              <a:rPr lang="en-US" b="1" i="1" dirty="0">
+                <a:latin typeface="Garamond" panose="02020404030301010803" pitchFamily="18" charset="0"/>
+              </a:rPr>
+              <a:t>M. </a:t>
+            </a:r>
+            <a:r>
+              <a:rPr lang="en-US" b="1" i="1" dirty="0" err="1">
+                <a:latin typeface="Garamond" panose="02020404030301010803" pitchFamily="18" charset="0"/>
+              </a:rPr>
+              <a:t>bovis</a:t>
+            </a:r>
+            <a:r>
+              <a:rPr lang="en-US" b="1" i="1" dirty="0">
+                <a:latin typeface="Garamond" panose="02020404030301010803" pitchFamily="18" charset="0"/>
+              </a:rPr>
+              <a:t> </a:t>
+            </a:r>
+            <a:r>
+              <a:rPr lang="en-US" b="1" dirty="0">
+                <a:latin typeface="Garamond" panose="02020404030301010803" pitchFamily="18" charset="0"/>
+              </a:rPr>
+              <a:t>isolates elucidate what factors across the molecular, population, and community scale lead to efficient transmission of spillover hosts?</a:t>
+            </a:r>
+          </a:p>
+          <a:p>
+            <a:endParaRPr lang="en-US" dirty="0">
+              <a:latin typeface="Garamond" panose="02020404030301010803" pitchFamily="18" charset="0"/>
+            </a:endParaRPr>
+          </a:p>
+        </p:txBody>
+      </p:sp>
+    </p:spTree>
+    <p:extLst>
+      <p:ext uri="{BB962C8B-B14F-4D97-AF65-F5344CB8AC3E}">
+        <p14:creationId xmlns:p14="http://schemas.microsoft.com/office/powerpoint/2010/main" val="423298319"/>
+      </p:ext>
+    </p:extLst>
+  </p:cSld>
+  <p:clrMapOvr>
+    <a:masterClrMapping/>
+  </p:clrMapOvr>
+</p:sld>
+</file>
+
+<file path=ppt/slides/slide7.xml><?xml version="1.0" encoding="utf-8"?>
+<p:sld xmlns:a="http://schemas.openxmlformats.org/drawingml/2006/main" xmlns:r="http://schemas.openxmlformats.org/officeDocument/2006/relationships" xmlns:p="http://schemas.openxmlformats.org/presentationml/2006/main">
+  <p:cSld>
+    <p:spTree>
+      <p:nvGrpSpPr>
+        <p:cNvPr id="1" name=""/>
+        <p:cNvGrpSpPr/>
+        <p:nvPr/>
+      </p:nvGrpSpPr>
+      <p:grpSpPr>
+        <a:xfrm>
+          <a:off x="0" y="0"/>
+          <a:ext cx="0" cy="0"/>
+          <a:chOff x="0" y="0"/>
+          <a:chExt cx="0" cy="0"/>
+        </a:xfrm>
+      </p:grpSpPr>
+      <p:sp>
+        <p:nvSpPr>
+          <p:cNvPr id="2" name="Title 1">
+            <a:extLst>
+              <a:ext uri="{FF2B5EF4-FFF2-40B4-BE49-F238E27FC236}">
+                <a16:creationId xmlns:a16="http://schemas.microsoft.com/office/drawing/2014/main" id="{5B6E373C-A14C-4341-BE1D-1568CFDA71A0}"/>
+              </a:ext>
+            </a:extLst>
+          </p:cNvPr>
+          <p:cNvSpPr>
+            <a:spLocks noGrp="1"/>
+          </p:cNvSpPr>
+          <p:nvPr>
+            <p:ph type="title"/>
+          </p:nvPr>
+        </p:nvSpPr>
+        <p:spPr>
+          <a:xfrm>
+            <a:off x="838199" y="365125"/>
+            <a:ext cx="11010499" cy="1325563"/>
+          </a:xfrm>
+        </p:spPr>
+        <p:txBody>
+          <a:bodyPr/>
+          <a:lstStyle/>
+          <a:p>
+            <a:r>
+              <a:rPr lang="en-US" dirty="0">
+                <a:latin typeface="Garamond" panose="02020404030301010803" pitchFamily="18" charset="0"/>
+              </a:rPr>
+              <a:t>Preliminary Analysis Data</a:t>
+            </a:r>
+          </a:p>
+        </p:txBody>
+      </p:sp>
+      <p:sp>
+        <p:nvSpPr>
+          <p:cNvPr id="3" name="Content Placeholder 2">
+            <a:extLst>
+              <a:ext uri="{FF2B5EF4-FFF2-40B4-BE49-F238E27FC236}">
+                <a16:creationId xmlns:a16="http://schemas.microsoft.com/office/drawing/2014/main" id="{464A2D37-3E87-584A-A0D4-8B6E512E9D7E}"/>
+              </a:ext>
+            </a:extLst>
+          </p:cNvPr>
+          <p:cNvSpPr>
+            <a:spLocks noGrp="1"/>
+          </p:cNvSpPr>
+          <p:nvPr>
+            <p:ph idx="1"/>
+          </p:nvPr>
+        </p:nvSpPr>
+        <p:spPr/>
+        <p:txBody>
+          <a:bodyPr/>
+          <a:lstStyle/>
+          <a:p>
+            <a:r>
+              <a:rPr lang="en-US" dirty="0">
+                <a:latin typeface="Garamond" panose="02020404030301010803" pitchFamily="18" charset="0"/>
+              </a:rPr>
+              <a:t>To understand if there was any relationship between genomic variability and host status, I pulled sequence data from three nations that have distinct maintenance hosts for </a:t>
+            </a:r>
+            <a:r>
+              <a:rPr lang="en-US" i="1" dirty="0">
+                <a:latin typeface="Garamond" panose="02020404030301010803" pitchFamily="18" charset="0"/>
+              </a:rPr>
+              <a:t>M. </a:t>
+            </a:r>
+            <a:r>
+              <a:rPr lang="en-US" i="1" dirty="0" err="1">
+                <a:latin typeface="Garamond" panose="02020404030301010803" pitchFamily="18" charset="0"/>
+              </a:rPr>
+              <a:t>bovis</a:t>
+            </a:r>
+            <a:r>
+              <a:rPr lang="en-US" i="1" dirty="0">
+                <a:latin typeface="Garamond" panose="02020404030301010803" pitchFamily="18" charset="0"/>
+              </a:rPr>
+              <a:t>:</a:t>
+            </a:r>
+          </a:p>
+          <a:p>
+            <a:pPr lvl="1"/>
+            <a:r>
+              <a:rPr lang="en-US" dirty="0">
+                <a:latin typeface="Garamond" panose="02020404030301010803" pitchFamily="18" charset="0"/>
+              </a:rPr>
+              <a:t>USA: white-tailed deer</a:t>
+            </a:r>
+          </a:p>
+          <a:p>
+            <a:pPr lvl="1"/>
+            <a:r>
+              <a:rPr lang="en-US" dirty="0">
+                <a:latin typeface="Garamond" panose="02020404030301010803" pitchFamily="18" charset="0"/>
+              </a:rPr>
+              <a:t>UK: badger</a:t>
+            </a:r>
+          </a:p>
+          <a:p>
+            <a:pPr lvl="1"/>
+            <a:r>
+              <a:rPr lang="en-US" dirty="0">
+                <a:latin typeface="Garamond" panose="02020404030301010803" pitchFamily="18" charset="0"/>
+              </a:rPr>
+              <a:t>NZ: </a:t>
+            </a:r>
+            <a:r>
+              <a:rPr lang="en-US" dirty="0" err="1">
+                <a:latin typeface="Garamond" panose="02020404030301010803" pitchFamily="18" charset="0"/>
+              </a:rPr>
+              <a:t>bushtail</a:t>
+            </a:r>
+            <a:r>
+              <a:rPr lang="en-US" dirty="0">
+                <a:latin typeface="Garamond" panose="02020404030301010803" pitchFamily="18" charset="0"/>
+              </a:rPr>
+              <a:t> possum</a:t>
+            </a:r>
+          </a:p>
+        </p:txBody>
+      </p:sp>
+    </p:spTree>
+    <p:extLst>
+      <p:ext uri="{BB962C8B-B14F-4D97-AF65-F5344CB8AC3E}">
+        <p14:creationId xmlns:p14="http://schemas.microsoft.com/office/powerpoint/2010/main" val="94774762"/>
+      </p:ext>
+    </p:extLst>
+  </p:cSld>
+  <p:clrMapOvr>
+    <a:masterClrMapping/>
+  </p:clrMapOvr>
+</p:sld>
+</file>
+
+<file path=ppt/slides/slide8.xml><?xml version="1.0" encoding="utf-8"?>
+<p:sld xmlns:a="http://schemas.openxmlformats.org/drawingml/2006/main" xmlns:r="http://schemas.openxmlformats.org/officeDocument/2006/relationships" xmlns:p="http://schemas.openxmlformats.org/presentationml/2006/main">
+  <p:cSld>
+    <p:spTree>
+      <p:nvGrpSpPr>
+        <p:cNvPr id="1" name=""/>
+        <p:cNvGrpSpPr/>
+        <p:nvPr/>
+      </p:nvGrpSpPr>
+      <p:grpSpPr>
+        <a:xfrm>
+          <a:off x="0" y="0"/>
+          <a:ext cx="0" cy="0"/>
+          <a:chOff x="0" y="0"/>
+          <a:chExt cx="0" cy="0"/>
+        </a:xfrm>
+      </p:grpSpPr>
+      <p:sp>
+        <p:nvSpPr>
+          <p:cNvPr id="2" name="Title 1">
+            <a:extLst>
+              <a:ext uri="{FF2B5EF4-FFF2-40B4-BE49-F238E27FC236}">
+                <a16:creationId xmlns:a16="http://schemas.microsoft.com/office/drawing/2014/main" id="{5B6E373C-A14C-4341-BE1D-1568CFDA71A0}"/>
+              </a:ext>
+            </a:extLst>
+          </p:cNvPr>
+          <p:cNvSpPr>
+            <a:spLocks noGrp="1"/>
+          </p:cNvSpPr>
+          <p:nvPr>
+            <p:ph type="title"/>
+          </p:nvPr>
+        </p:nvSpPr>
+        <p:spPr>
+          <a:xfrm>
+            <a:off x="838199" y="365125"/>
+            <a:ext cx="11010499" cy="1325563"/>
+          </a:xfrm>
+        </p:spPr>
+        <p:txBody>
+          <a:bodyPr/>
+          <a:lstStyle/>
+          <a:p>
+            <a:r>
+              <a:rPr lang="en-US" i="1" dirty="0">
+                <a:latin typeface="Garamond" panose="02020404030301010803" pitchFamily="18" charset="0"/>
+              </a:rPr>
+              <a:t>M. </a:t>
+            </a:r>
+            <a:r>
+              <a:rPr lang="en-US" i="1" dirty="0" err="1">
+                <a:latin typeface="Garamond" panose="02020404030301010803" pitchFamily="18" charset="0"/>
+              </a:rPr>
+              <a:t>bovis</a:t>
+            </a:r>
+            <a:r>
+              <a:rPr lang="en-US" i="1" dirty="0">
+                <a:latin typeface="Garamond" panose="02020404030301010803" pitchFamily="18" charset="0"/>
+              </a:rPr>
+              <a:t> </a:t>
+            </a:r>
+            <a:r>
+              <a:rPr lang="en-US" dirty="0" err="1">
+                <a:latin typeface="Garamond" panose="02020404030301010803" pitchFamily="18" charset="0"/>
+              </a:rPr>
+              <a:t>Pangenomic</a:t>
+            </a:r>
+            <a:r>
+              <a:rPr lang="en-US" dirty="0">
+                <a:latin typeface="Garamond" panose="02020404030301010803" pitchFamily="18" charset="0"/>
+              </a:rPr>
+              <a:t> Framework</a:t>
+            </a:r>
+            <a:endParaRPr lang="en-US" i="1" dirty="0">
+              <a:latin typeface="Garamond" panose="02020404030301010803" pitchFamily="18" charset="0"/>
+            </a:endParaRPr>
+          </a:p>
+        </p:txBody>
+      </p:sp>
+      <p:sp>
+        <p:nvSpPr>
+          <p:cNvPr id="3" name="Content Placeholder 2">
+            <a:extLst>
+              <a:ext uri="{FF2B5EF4-FFF2-40B4-BE49-F238E27FC236}">
+                <a16:creationId xmlns:a16="http://schemas.microsoft.com/office/drawing/2014/main" id="{464A2D37-3E87-584A-A0D4-8B6E512E9D7E}"/>
+              </a:ext>
+            </a:extLst>
+          </p:cNvPr>
+          <p:cNvSpPr>
+            <a:spLocks noGrp="1"/>
+          </p:cNvSpPr>
+          <p:nvPr>
+            <p:ph idx="1"/>
+          </p:nvPr>
+        </p:nvSpPr>
+        <p:spPr/>
+        <p:txBody>
+          <a:bodyPr/>
+          <a:lstStyle/>
+          <a:p>
+            <a:r>
+              <a:rPr lang="en-US" dirty="0">
+                <a:latin typeface="Garamond" panose="02020404030301010803" pitchFamily="18" charset="0"/>
+              </a:rPr>
+              <a:t>Once the data was collected, inferring the pangenome was the next step to investigate genomic attributes.</a:t>
+            </a:r>
+          </a:p>
+          <a:p>
+            <a:pPr lvl="1"/>
+            <a:r>
+              <a:rPr lang="en-US" dirty="0">
+                <a:latin typeface="Garamond" panose="02020404030301010803" pitchFamily="18" charset="0"/>
+              </a:rPr>
+              <a:t>Core Genome</a:t>
+            </a:r>
+          </a:p>
+          <a:p>
+            <a:pPr lvl="2"/>
+            <a:r>
+              <a:rPr lang="en-US" dirty="0">
+                <a:latin typeface="Garamond" panose="02020404030301010803" pitchFamily="18" charset="0"/>
+              </a:rPr>
+              <a:t>Areas of Selection + Homologous Recombination</a:t>
+            </a:r>
+          </a:p>
+          <a:p>
+            <a:pPr lvl="2"/>
+            <a:r>
+              <a:rPr lang="en-US" dirty="0">
+                <a:latin typeface="Garamond" panose="02020404030301010803" pitchFamily="18" charset="0"/>
+              </a:rPr>
+              <a:t>Maximum Likelihood Phylogenetic Tree</a:t>
+            </a:r>
+          </a:p>
+          <a:p>
+            <a:pPr lvl="1"/>
+            <a:r>
+              <a:rPr lang="en-US" dirty="0">
+                <a:latin typeface="Garamond" panose="02020404030301010803" pitchFamily="18" charset="0"/>
+              </a:rPr>
+              <a:t>Accessory Genome</a:t>
+            </a:r>
+          </a:p>
+          <a:p>
+            <a:pPr lvl="2"/>
+            <a:r>
+              <a:rPr lang="en-US" dirty="0">
+                <a:latin typeface="Garamond" panose="02020404030301010803" pitchFamily="18" charset="0"/>
+              </a:rPr>
+              <a:t>Principal Component Analysis (PCA) clustering</a:t>
+            </a:r>
+          </a:p>
+          <a:p>
+            <a:endParaRPr lang="en-US" dirty="0">
+              <a:latin typeface="Garamond" panose="02020404030301010803" pitchFamily="18" charset="0"/>
+            </a:endParaRPr>
+          </a:p>
+        </p:txBody>
+      </p:sp>
+    </p:spTree>
+    <p:extLst>
+      <p:ext uri="{BB962C8B-B14F-4D97-AF65-F5344CB8AC3E}">
+        <p14:creationId xmlns:p14="http://schemas.microsoft.com/office/powerpoint/2010/main" val="3346882959"/>
+      </p:ext>
+    </p:extLst>
+  </p:cSld>
+  <p:clrMapOvr>
+    <a:masterClrMapping/>
+  </p:clrMapOvr>
+</p:sld>
+</file>
+
+<file path=ppt/slides/slide9.xml><?xml version="1.0" encoding="utf-8"?>
+<p:sld xmlns:a="http://schemas.openxmlformats.org/drawingml/2006/main" xmlns:r="http://schemas.openxmlformats.org/officeDocument/2006/relationships" xmlns:p="http://schemas.openxmlformats.org/presentationml/2006/main">
+  <p:cSld>
+    <p:spTree>
+      <p:nvGrpSpPr>
+        <p:cNvPr id="1" name=""/>
+        <p:cNvGrpSpPr/>
+        <p:nvPr/>
+      </p:nvGrpSpPr>
+      <p:grpSpPr>
+        <a:xfrm>
+          <a:off x="0" y="0"/>
+          <a:ext cx="0" cy="0"/>
+          <a:chOff x="0" y="0"/>
+          <a:chExt cx="0" cy="0"/>
+        </a:xfrm>
+      </p:grpSpPr>
+      <p:sp>
+        <p:nvSpPr>
+          <p:cNvPr id="2" name="Title 1">
+            <a:extLst>
+              <a:ext uri="{FF2B5EF4-FFF2-40B4-BE49-F238E27FC236}">
+                <a16:creationId xmlns:a16="http://schemas.microsoft.com/office/drawing/2014/main" id="{5B6E373C-A14C-4341-BE1D-1568CFDA71A0}"/>
+              </a:ext>
+            </a:extLst>
+          </p:cNvPr>
+          <p:cNvSpPr>
+            <a:spLocks noGrp="1"/>
+          </p:cNvSpPr>
+          <p:nvPr>
+            <p:ph type="title"/>
+          </p:nvPr>
+        </p:nvSpPr>
+        <p:spPr>
+          <a:xfrm>
+            <a:off x="838199" y="365125"/>
+            <a:ext cx="11010499" cy="1325563"/>
+          </a:xfrm>
+        </p:spPr>
+        <p:txBody>
+          <a:bodyPr/>
+          <a:lstStyle/>
+          <a:p>
+            <a:r>
+              <a:rPr lang="en-US" dirty="0">
+                <a:latin typeface="Garamond" panose="02020404030301010803" pitchFamily="18" charset="0"/>
+              </a:rPr>
+              <a:t>PCA result</a:t>
+            </a:r>
+          </a:p>
+        </p:txBody>
+      </p:sp>
+      <p:sp>
+        <p:nvSpPr>
+          <p:cNvPr id="3" name="Content Placeholder 2">
+            <a:extLst>
+              <a:ext uri="{FF2B5EF4-FFF2-40B4-BE49-F238E27FC236}">
+                <a16:creationId xmlns:a16="http://schemas.microsoft.com/office/drawing/2014/main" id="{464A2D37-3E87-584A-A0D4-8B6E512E9D7E}"/>
+              </a:ext>
+            </a:extLst>
+          </p:cNvPr>
+          <p:cNvSpPr>
+            <a:spLocks noGrp="1"/>
+          </p:cNvSpPr>
+          <p:nvPr>
+            <p:ph idx="1"/>
+          </p:nvPr>
+        </p:nvSpPr>
+        <p:spPr/>
+        <p:txBody>
+          <a:bodyPr/>
+          <a:lstStyle/>
+          <a:p>
+            <a:endParaRPr lang="en-US" dirty="0">
+              <a:latin typeface="Garamond" panose="02020404030301010803" pitchFamily="18" charset="0"/>
+            </a:endParaRPr>
+          </a:p>
+        </p:txBody>
+      </p:sp>
+    </p:spTree>
+    <p:extLst>
+      <p:ext uri="{BB962C8B-B14F-4D97-AF65-F5344CB8AC3E}">
+        <p14:creationId xmlns:p14="http://schemas.microsoft.com/office/powerpoint/2010/main" val="3421620348"/>
       </p:ext>
     </p:extLst>
   </p:cSld>

</xml_diff>